<commit_message>
Presentation fixes and minor updates
</commit_message>
<xml_diff>
--- a/planning_and_presentations/Field Calculator Presentation.pptx
+++ b/planning_and_presentations/Field Calculator Presentation.pptx
@@ -5,25 +5,24 @@
     <p:sldMasterId id="2147483648" r:id="rId1"/>
   </p:sldMasterIdLst>
   <p:notesMasterIdLst>
-    <p:notesMasterId r:id="rId18"/>
+    <p:notesMasterId r:id="rId17"/>
   </p:notesMasterIdLst>
   <p:sldIdLst>
     <p:sldId id="298" r:id="rId2"/>
     <p:sldId id="299" r:id="rId3"/>
-    <p:sldId id="300" r:id="rId4"/>
-    <p:sldId id="301" r:id="rId5"/>
-    <p:sldId id="302" r:id="rId6"/>
-    <p:sldId id="256" r:id="rId7"/>
-    <p:sldId id="260" r:id="rId8"/>
-    <p:sldId id="261" r:id="rId9"/>
+    <p:sldId id="260" r:id="rId4"/>
+    <p:sldId id="261" r:id="rId5"/>
+    <p:sldId id="300" r:id="rId6"/>
+    <p:sldId id="282" r:id="rId7"/>
+    <p:sldId id="301" r:id="rId8"/>
+    <p:sldId id="302" r:id="rId9"/>
     <p:sldId id="264" r:id="rId10"/>
-    <p:sldId id="282" r:id="rId11"/>
-    <p:sldId id="283" r:id="rId12"/>
-    <p:sldId id="284" r:id="rId13"/>
-    <p:sldId id="285" r:id="rId14"/>
+    <p:sldId id="283" r:id="rId11"/>
+    <p:sldId id="284" r:id="rId12"/>
+    <p:sldId id="285" r:id="rId13"/>
+    <p:sldId id="278" r:id="rId14"/>
     <p:sldId id="268" r:id="rId15"/>
     <p:sldId id="279" r:id="rId16"/>
-    <p:sldId id="278" r:id="rId17"/>
   </p:sldIdLst>
   <p:sldSz cx="9144000" cy="6858000" type="screen4x3"/>
   <p:notesSz cx="6858000" cy="9144000"/>
@@ -223,7 +222,7 @@
           <a:p>
             <a:fld id="{DBA41DBC-B9D2-4146-BB34-AFC3BEE57B3A}" type="datetimeFigureOut">
               <a:rPr lang="en-US" smtClean="0"/>
-              <a:t>2/12/2019</a:t>
+              <a:t>2/13/2019</a:t>
             </a:fld>
             <a:endParaRPr lang="en-US"/>
           </a:p>
@@ -564,7 +563,7 @@
           <a:p>
             <a:fld id="{79903EB6-C2DC-4019-9369-AB2289AF3E40}" type="slidenum">
               <a:rPr lang="en-US" smtClean="0"/>
-              <a:t>7</a:t>
+              <a:t>3</a:t>
             </a:fld>
             <a:endParaRPr lang="en-US"/>
           </a:p>
@@ -656,7 +655,7 @@
           <a:p>
             <a:fld id="{79903EB6-C2DC-4019-9369-AB2289AF3E40}" type="slidenum">
               <a:rPr lang="en-US" smtClean="0"/>
-              <a:t>8</a:t>
+              <a:t>4</a:t>
             </a:fld>
             <a:endParaRPr lang="en-US"/>
           </a:p>
@@ -719,14 +718,6 @@
           <a:bodyPr/>
           <a:lstStyle/>
           <a:p>
-            <a:r>
-              <a:rPr lang="en-US" dirty="0" smtClean="0"/>
-              <a:t>Ask who has</a:t>
-            </a:r>
-            <a:r>
-              <a:rPr lang="en-US" baseline="0" dirty="0" smtClean="0"/>
-              <a:t> ever written a program before.</a:t>
-            </a:r>
             <a:endParaRPr lang="en-US" dirty="0"/>
           </a:p>
         </p:txBody>
@@ -748,7 +739,7 @@
           <a:p>
             <a:fld id="{79903EB6-C2DC-4019-9369-AB2289AF3E40}" type="slidenum">
               <a:rPr lang="en-US" smtClean="0"/>
-              <a:t>9</a:t>
+              <a:t>6</a:t>
             </a:fld>
             <a:endParaRPr lang="en-US"/>
           </a:p>
@@ -757,7 +748,7 @@
     </p:spTree>
     <p:extLst>
       <p:ext uri="{BB962C8B-B14F-4D97-AF65-F5344CB8AC3E}">
-        <p14:creationId xmlns:p14="http://schemas.microsoft.com/office/powerpoint/2010/main" val="3201388165"/>
+        <p14:creationId xmlns:p14="http://schemas.microsoft.com/office/powerpoint/2010/main" val="4183802253"/>
       </p:ext>
     </p:extLst>
   </p:cSld>
@@ -811,6 +802,14 @@
           <a:bodyPr/>
           <a:lstStyle/>
           <a:p>
+            <a:r>
+              <a:rPr lang="en-US" dirty="0" smtClean="0"/>
+              <a:t>Ask who has</a:t>
+            </a:r>
+            <a:r>
+              <a:rPr lang="en-US" baseline="0" dirty="0" smtClean="0"/>
+              <a:t> ever written a program before.</a:t>
+            </a:r>
             <a:endParaRPr lang="en-US" dirty="0"/>
           </a:p>
         </p:txBody>
@@ -832,7 +831,7 @@
           <a:p>
             <a:fld id="{79903EB6-C2DC-4019-9369-AB2289AF3E40}" type="slidenum">
               <a:rPr lang="en-US" smtClean="0"/>
-              <a:t>10</a:t>
+              <a:t>9</a:t>
             </a:fld>
             <a:endParaRPr lang="en-US"/>
           </a:p>
@@ -841,7 +840,7 @@
     </p:spTree>
     <p:extLst>
       <p:ext uri="{BB962C8B-B14F-4D97-AF65-F5344CB8AC3E}">
-        <p14:creationId xmlns:p14="http://schemas.microsoft.com/office/powerpoint/2010/main" val="4183802253"/>
+        <p14:creationId xmlns:p14="http://schemas.microsoft.com/office/powerpoint/2010/main" val="3201388165"/>
       </p:ext>
     </p:extLst>
   </p:cSld>
@@ -1124,7 +1123,7 @@
           <a:p>
             <a:fld id="{1D482510-8020-4010-8642-9CFCF8437839}" type="datetimeFigureOut">
               <a:rPr lang="en-US" smtClean="0"/>
-              <a:t>2/12/2019</a:t>
+              <a:t>2/13/2019</a:t>
             </a:fld>
             <a:endParaRPr lang="en-US"/>
           </a:p>
@@ -1294,7 +1293,7 @@
           <a:p>
             <a:fld id="{1D482510-8020-4010-8642-9CFCF8437839}" type="datetimeFigureOut">
               <a:rPr lang="en-US" smtClean="0"/>
-              <a:t>2/12/2019</a:t>
+              <a:t>2/13/2019</a:t>
             </a:fld>
             <a:endParaRPr lang="en-US"/>
           </a:p>
@@ -1474,7 +1473,7 @@
           <a:p>
             <a:fld id="{1D482510-8020-4010-8642-9CFCF8437839}" type="datetimeFigureOut">
               <a:rPr lang="en-US" smtClean="0"/>
-              <a:t>2/12/2019</a:t>
+              <a:t>2/13/2019</a:t>
             </a:fld>
             <a:endParaRPr lang="en-US"/>
           </a:p>
@@ -1659,7 +1658,7 @@
           <a:p>
             <a:fld id="{1D482510-8020-4010-8642-9CFCF8437839}" type="datetimeFigureOut">
               <a:rPr lang="en-US" smtClean="0"/>
-              <a:t>2/12/2019</a:t>
+              <a:t>2/13/2019</a:t>
             </a:fld>
             <a:endParaRPr lang="en-US"/>
           </a:p>
@@ -1949,7 +1948,7 @@
           <a:p>
             <a:fld id="{1D482510-8020-4010-8642-9CFCF8437839}" type="datetimeFigureOut">
               <a:rPr lang="en-US" smtClean="0"/>
-              <a:t>2/12/2019</a:t>
+              <a:t>2/13/2019</a:t>
             </a:fld>
             <a:endParaRPr lang="en-US"/>
           </a:p>
@@ -2237,7 +2236,7 @@
           <a:p>
             <a:fld id="{1D482510-8020-4010-8642-9CFCF8437839}" type="datetimeFigureOut">
               <a:rPr lang="en-US" smtClean="0"/>
-              <a:t>2/12/2019</a:t>
+              <a:t>2/13/2019</a:t>
             </a:fld>
             <a:endParaRPr lang="en-US"/>
           </a:p>
@@ -2659,7 +2658,7 @@
           <a:p>
             <a:fld id="{1D482510-8020-4010-8642-9CFCF8437839}" type="datetimeFigureOut">
               <a:rPr lang="en-US" smtClean="0"/>
-              <a:t>2/12/2019</a:t>
+              <a:t>2/13/2019</a:t>
             </a:fld>
             <a:endParaRPr lang="en-US"/>
           </a:p>
@@ -2777,7 +2776,7 @@
           <a:p>
             <a:fld id="{1D482510-8020-4010-8642-9CFCF8437839}" type="datetimeFigureOut">
               <a:rPr lang="en-US" smtClean="0"/>
-              <a:t>2/12/2019</a:t>
+              <a:t>2/13/2019</a:t>
             </a:fld>
             <a:endParaRPr lang="en-US"/>
           </a:p>
@@ -2872,7 +2871,7 @@
           <a:p>
             <a:fld id="{1D482510-8020-4010-8642-9CFCF8437839}" type="datetimeFigureOut">
               <a:rPr lang="en-US" smtClean="0"/>
-              <a:t>2/12/2019</a:t>
+              <a:t>2/13/2019</a:t>
             </a:fld>
             <a:endParaRPr lang="en-US"/>
           </a:p>
@@ -3149,7 +3148,7 @@
           <a:p>
             <a:fld id="{1D482510-8020-4010-8642-9CFCF8437839}" type="datetimeFigureOut">
               <a:rPr lang="en-US" smtClean="0"/>
-              <a:t>2/12/2019</a:t>
+              <a:t>2/13/2019</a:t>
             </a:fld>
             <a:endParaRPr lang="en-US"/>
           </a:p>
@@ -3402,7 +3401,7 @@
           <a:p>
             <a:fld id="{1D482510-8020-4010-8642-9CFCF8437839}" type="datetimeFigureOut">
               <a:rPr lang="en-US" smtClean="0"/>
-              <a:t>2/12/2019</a:t>
+              <a:t>2/13/2019</a:t>
             </a:fld>
             <a:endParaRPr lang="en-US"/>
           </a:p>
@@ -3762,7 +3761,7 @@
           <a:p>
             <a:fld id="{1D482510-8020-4010-8642-9CFCF8437839}" type="datetimeFigureOut">
               <a:rPr lang="en-US" smtClean="0"/>
-              <a:t>2/12/2019</a:t>
+              <a:t>2/13/2019</a:t>
             </a:fld>
             <a:endParaRPr lang="en-US"/>
           </a:p>
@@ -4244,7 +4243,7 @@
           <a:p>
             <a:r>
               <a:rPr lang="en-US" dirty="0" smtClean="0"/>
-              <a:t>Basic Python Terminology</a:t>
+              <a:t>Additional Terminology</a:t>
             </a:r>
             <a:endParaRPr lang="en-US" dirty="0"/>
           </a:p>
@@ -4265,9 +4264,6 @@
             <a:off x="762000" y="1219200"/>
             <a:ext cx="7924800" cy="5486400"/>
           </a:xfrm>
-          <a:ln>
-            <a:noFill/>
-          </a:ln>
         </p:spPr>
         <p:txBody>
           <a:bodyPr>
@@ -4283,36 +4279,69 @@
                   </a:schemeClr>
                 </a:solidFill>
               </a:rPr>
-              <a:t>Statement</a:t>
+              <a:t>Class</a:t>
             </a:r>
           </a:p>
           <a:p>
             <a:pPr lvl="1"/>
             <a:r>
               <a:rPr lang="en-US" dirty="0" smtClean="0"/>
-              <a:t>A line of code that does some work</a:t>
-            </a:r>
-          </a:p>
-          <a:p>
-            <a:r>
-              <a:rPr lang="en-US" dirty="0" smtClean="0">
+              <a:t>An abstracted collection of variables and methods that represent some larger concept</a:t>
+            </a:r>
+          </a:p>
+          <a:p>
+            <a:pPr lvl="2"/>
+            <a:r>
+              <a:rPr lang="en-US" dirty="0" err="1" smtClean="0"/>
+              <a:t>Eg</a:t>
+            </a:r>
+            <a:r>
+              <a:rPr lang="en-US" dirty="0" smtClean="0"/>
+              <a:t>: a car – </a:t>
+            </a:r>
+            <a:r>
+              <a:rPr lang="en-US" i="1" dirty="0" smtClean="0"/>
+              <a:t>generic concept</a:t>
+            </a:r>
+          </a:p>
+          <a:p>
+            <a:pPr lvl="1"/>
+            <a:r>
+              <a:rPr lang="en-US" dirty="0">
                 <a:solidFill>
                   <a:schemeClr val="accent2">
                     <a:lumMod val="50000"/>
                   </a:schemeClr>
                 </a:solidFill>
               </a:rPr>
-              <a:t>Variable</a:t>
-            </a:r>
+              <a:t>Instance Object or Instance</a:t>
+            </a:r>
+          </a:p>
+          <a:p>
+            <a:pPr lvl="2"/>
+            <a:r>
+              <a:rPr lang="en-US" dirty="0"/>
+              <a:t>The class, when in use, and with data – like a variable with information, where the variable has a structure predefined by the class</a:t>
+            </a:r>
+          </a:p>
+          <a:p>
+            <a:pPr lvl="3"/>
+            <a:r>
+              <a:rPr lang="en-US" dirty="0" err="1" smtClean="0"/>
+              <a:t>Eg</a:t>
+            </a:r>
+            <a:r>
+              <a:rPr lang="en-US" dirty="0" smtClean="0"/>
+              <a:t>: Your 1996 Ford Taurus – </a:t>
+            </a:r>
+            <a:r>
+              <a:rPr lang="en-US" i="1" dirty="0" smtClean="0"/>
+              <a:t>specific incarnation</a:t>
+            </a:r>
+            <a:endParaRPr lang="en-US" i="1" dirty="0"/>
           </a:p>
           <a:p>
             <a:pPr lvl="1"/>
-            <a:r>
-              <a:rPr lang="en-US" dirty="0" smtClean="0"/>
-              <a:t>Just like in algebra, these are names for values that can change</a:t>
-            </a:r>
-          </a:p>
-          <a:p>
             <a:r>
               <a:rPr lang="en-US" dirty="0" smtClean="0">
                 <a:solidFill>
@@ -4321,15 +4350,31 @@
                   </a:schemeClr>
                 </a:solidFill>
               </a:rPr>
-              <a:t>String</a:t>
-            </a:r>
-          </a:p>
-          <a:p>
-            <a:pPr lvl="1"/>
+              <a:t>Method</a:t>
+            </a:r>
+          </a:p>
+          <a:p>
+            <a:pPr lvl="2"/>
             <a:r>
               <a:rPr lang="en-US" dirty="0" smtClean="0"/>
-              <a:t>Think of it as text – letters strung along one after another</a:t>
-            </a:r>
+              <a:t>Like a function, but operates on class data</a:t>
+            </a:r>
+          </a:p>
+          <a:p>
+            <a:pPr lvl="3"/>
+            <a:r>
+              <a:rPr lang="en-US" dirty="0" err="1" smtClean="0"/>
+              <a:t>Eg</a:t>
+            </a:r>
+            <a:r>
+              <a:rPr lang="en-US" dirty="0" smtClean="0"/>
+              <a:t>: Drive! – </a:t>
+            </a:r>
+            <a:r>
+              <a:rPr lang="en-US" i="1" dirty="0" smtClean="0"/>
+              <a:t>do something</a:t>
+            </a:r>
+            <a:endParaRPr lang="en-US" i="1" dirty="0"/>
           </a:p>
           <a:p>
             <a:r>
@@ -4340,43 +4385,33 @@
                   </a:schemeClr>
                 </a:solidFill>
               </a:rPr>
-              <a:t>Function</a:t>
-            </a:r>
-          </a:p>
-          <a:p>
-            <a:pPr lvl="1"/>
-            <a:r>
-              <a:rPr lang="en-US" dirty="0" smtClean="0"/>
-              <a:t>A named block of code that can be reused</a:t>
-            </a:r>
-          </a:p>
-          <a:p>
-            <a:r>
-              <a:rPr lang="en-US" dirty="0" smtClean="0">
+              <a:t>Module </a:t>
+            </a:r>
+            <a:r>
+              <a:rPr lang="en-US" dirty="0">
                 <a:solidFill>
                   <a:schemeClr val="accent2">
                     <a:lumMod val="50000"/>
                   </a:schemeClr>
                 </a:solidFill>
               </a:rPr>
-              <a:t>Block</a:t>
+              <a:t>or Package</a:t>
             </a:r>
           </a:p>
           <a:p>
             <a:pPr lvl="1"/>
             <a:r>
               <a:rPr lang="en-US" dirty="0" smtClean="0"/>
-              <a:t>A set of code that executes together</a:t>
-            </a:r>
-          </a:p>
-          <a:p>
-            <a:pPr lvl="1"/>
+              <a:t>Reusable code that you can bring into your own code. </a:t>
+            </a:r>
+            <a:r>
+              <a:rPr lang="en-US" dirty="0" err="1" smtClean="0"/>
+              <a:t>Arcpy</a:t>
+            </a:r>
             <a:r>
               <a:rPr lang="en-US" dirty="0" smtClean="0"/>
-              <a:t>This will make sense when we start looking at code</a:t>
-            </a:r>
-          </a:p>
-          <a:p>
+              <a:t> is an example of a package</a:t>
+            </a:r>
             <a:endParaRPr lang="en-US" dirty="0"/>
           </a:p>
         </p:txBody>
@@ -4384,7 +4419,7 @@
     </p:spTree>
     <p:extLst>
       <p:ext uri="{BB962C8B-B14F-4D97-AF65-F5344CB8AC3E}">
-        <p14:creationId xmlns:p14="http://schemas.microsoft.com/office/powerpoint/2010/main" val="3780303758"/>
+        <p14:creationId xmlns:p14="http://schemas.microsoft.com/office/powerpoint/2010/main" val="824069388"/>
       </p:ext>
     </p:extLst>
   </p:cSld>
@@ -4435,7 +4470,7 @@
           <a:p>
             <a:r>
               <a:rPr lang="en-US" dirty="0" smtClean="0"/>
-              <a:t>Additional Terminology</a:t>
+              <a:t>Talking like a programmer</a:t>
             </a:r>
             <a:endParaRPr lang="en-US" dirty="0"/>
           </a:p>
@@ -4451,15 +4486,10 @@
             <p:ph idx="1"/>
           </p:nvPr>
         </p:nvSpPr>
-        <p:spPr>
-          <a:xfrm>
-            <a:off x="762000" y="1219200"/>
-            <a:ext cx="7924800" cy="5486400"/>
-          </a:xfrm>
-        </p:spPr>
+        <p:spPr/>
         <p:txBody>
           <a:bodyPr>
-            <a:normAutofit fontScale="92500" lnSpcReduction="20000"/>
+            <a:normAutofit/>
           </a:bodyPr>
           <a:lstStyle/>
           <a:p>
@@ -4471,69 +4501,36 @@
                   </a:schemeClr>
                 </a:solidFill>
               </a:rPr>
-              <a:t>Class</a:t>
+              <a:t>Argument/Parameter</a:t>
             </a:r>
           </a:p>
           <a:p>
             <a:pPr lvl="1"/>
             <a:r>
               <a:rPr lang="en-US" dirty="0" smtClean="0"/>
-              <a:t>An abstracted collection of variables and methods that represent some larger concept</a:t>
-            </a:r>
-          </a:p>
-          <a:p>
-            <a:pPr lvl="2"/>
-            <a:r>
-              <a:rPr lang="en-US" dirty="0" err="1" smtClean="0"/>
-              <a:t>Eg</a:t>
-            </a:r>
-            <a:r>
-              <a:rPr lang="en-US" dirty="0" smtClean="0"/>
-              <a:t>: a car – </a:t>
-            </a:r>
-            <a:r>
-              <a:rPr lang="en-US" i="1" dirty="0" smtClean="0"/>
-              <a:t>generic concept</a:t>
-            </a:r>
-          </a:p>
-          <a:p>
-            <a:pPr lvl="1"/>
-            <a:r>
-              <a:rPr lang="en-US" dirty="0">
+              <a:t>Variable data passed into a function or script to provide the context and information for the code</a:t>
+            </a:r>
+          </a:p>
+          <a:p>
+            <a:r>
+              <a:rPr lang="en-US" dirty="0" smtClean="0">
                 <a:solidFill>
                   <a:schemeClr val="accent2">
                     <a:lumMod val="50000"/>
                   </a:schemeClr>
                 </a:solidFill>
               </a:rPr>
-              <a:t>Instance Object or Instance</a:t>
-            </a:r>
-          </a:p>
-          <a:p>
-            <a:pPr lvl="2"/>
-            <a:r>
-              <a:rPr lang="en-US" dirty="0"/>
-              <a:t>The class, when in use, and with data – like a variable with information, where the variable has a structure predefined by the class</a:t>
-            </a:r>
-          </a:p>
-          <a:p>
-            <a:pPr lvl="3"/>
-            <a:r>
-              <a:rPr lang="en-US" dirty="0" err="1" smtClean="0"/>
-              <a:t>Eg</a:t>
-            </a:r>
+              <a:t>Exception</a:t>
+            </a:r>
+          </a:p>
+          <a:p>
+            <a:pPr lvl="1"/>
             <a:r>
               <a:rPr lang="en-US" dirty="0" smtClean="0"/>
-              <a:t>: Your 1996 Ford Taurus – </a:t>
-            </a:r>
-            <a:r>
-              <a:rPr lang="en-US" i="1" dirty="0" smtClean="0"/>
-              <a:t>specific incarnation</a:t>
-            </a:r>
-            <a:endParaRPr lang="en-US" i="1" dirty="0"/>
-          </a:p>
-          <a:p>
-            <a:pPr lvl="1"/>
+              <a:t>An unexpected condition in the program - difficult to recover from without additional coding to handle them. For our purposes, a crash</a:t>
+            </a:r>
+          </a:p>
+          <a:p>
             <a:r>
               <a:rPr lang="en-US" dirty="0" smtClean="0">
                 <a:solidFill>
@@ -4542,67 +4539,14 @@
                   </a:schemeClr>
                 </a:solidFill>
               </a:rPr>
-              <a:t>Method</a:t>
-            </a:r>
-          </a:p>
-          <a:p>
-            <a:pPr lvl="2"/>
+              <a:t>Comment</a:t>
+            </a:r>
+          </a:p>
+          <a:p>
+            <a:pPr lvl="1"/>
             <a:r>
               <a:rPr lang="en-US" dirty="0" smtClean="0"/>
-              <a:t>Like a function, but operates on class data</a:t>
-            </a:r>
-          </a:p>
-          <a:p>
-            <a:pPr lvl="3"/>
-            <a:r>
-              <a:rPr lang="en-US" dirty="0" err="1" smtClean="0"/>
-              <a:t>Eg</a:t>
-            </a:r>
-            <a:r>
-              <a:rPr lang="en-US" dirty="0" smtClean="0"/>
-              <a:t>: Drive! – </a:t>
-            </a:r>
-            <a:r>
-              <a:rPr lang="en-US" i="1" dirty="0" smtClean="0"/>
-              <a:t>do something</a:t>
-            </a:r>
-            <a:endParaRPr lang="en-US" i="1" dirty="0"/>
-          </a:p>
-          <a:p>
-            <a:r>
-              <a:rPr lang="en-US" dirty="0" smtClean="0">
-                <a:solidFill>
-                  <a:schemeClr val="accent2">
-                    <a:lumMod val="50000"/>
-                  </a:schemeClr>
-                </a:solidFill>
-              </a:rPr>
-              <a:t>Module </a:t>
-            </a:r>
-            <a:r>
-              <a:rPr lang="en-US" dirty="0">
-                <a:solidFill>
-                  <a:schemeClr val="accent2">
-                    <a:lumMod val="50000"/>
-                  </a:schemeClr>
-                </a:solidFill>
-              </a:rPr>
-              <a:t>or Package</a:t>
-            </a:r>
-          </a:p>
-          <a:p>
-            <a:pPr lvl="1"/>
-            <a:r>
-              <a:rPr lang="en-US" dirty="0" smtClean="0"/>
-              <a:t>Reusable code that you can bring into your own code. </a:t>
-            </a:r>
-            <a:r>
-              <a:rPr lang="en-US" dirty="0" err="1" smtClean="0"/>
-              <a:t>Arcpy</a:t>
-            </a:r>
-            <a:r>
-              <a:rPr lang="en-US" dirty="0" smtClean="0"/>
-              <a:t> is an example of a package</a:t>
+              <a:t>Embedded, non-code English (or other human language) explanations of what is contained in the code.</a:t>
             </a:r>
             <a:endParaRPr lang="en-US" dirty="0"/>
           </a:p>
@@ -4611,7 +4555,7 @@
     </p:spTree>
     <p:extLst>
       <p:ext uri="{BB962C8B-B14F-4D97-AF65-F5344CB8AC3E}">
-        <p14:creationId xmlns:p14="http://schemas.microsoft.com/office/powerpoint/2010/main" val="824069388"/>
+        <p14:creationId xmlns:p14="http://schemas.microsoft.com/office/powerpoint/2010/main" val="1953321995"/>
       </p:ext>
     </p:extLst>
   </p:cSld>
@@ -4661,10 +4605,10 @@
           <a:lstStyle/>
           <a:p>
             <a:r>
-              <a:rPr lang="en-US" dirty="0" smtClean="0"/>
-              <a:t>Talking like a programmer</a:t>
-            </a:r>
-            <a:endParaRPr lang="en-US" dirty="0"/>
+              <a:rPr lang="en-US" smtClean="0"/>
+              <a:t>Failing Gracefully</a:t>
+            </a:r>
+            <a:endParaRPr lang="en-US"/>
           </a:p>
         </p:txBody>
       </p:sp>
@@ -4681,64 +4625,134 @@
         <p:spPr/>
         <p:txBody>
           <a:bodyPr>
-            <a:normAutofit/>
+            <a:normAutofit lnSpcReduction="10000"/>
           </a:bodyPr>
           <a:lstStyle/>
           <a:p>
             <a:r>
+              <a:rPr lang="en-US" dirty="0" smtClean="0"/>
+              <a:t>Rule #1 of programs is – they </a:t>
+            </a:r>
+            <a:r>
+              <a:rPr lang="en-US" i="1" dirty="0" smtClean="0"/>
+              <a:t>break</a:t>
+            </a:r>
+            <a:r>
+              <a:rPr lang="en-US" dirty="0" smtClean="0"/>
+              <a:t>, and never work on the first try.</a:t>
+            </a:r>
+          </a:p>
+          <a:p>
+            <a:pPr lvl="1"/>
+            <a:r>
+              <a:rPr lang="en-US" dirty="0" smtClean="0"/>
+              <a:t>So, we go back to </a:t>
+            </a:r>
+            <a:r>
+              <a:rPr lang="en-US" b="1" dirty="0" smtClean="0"/>
+              <a:t>debugging</a:t>
+            </a:r>
+            <a:endParaRPr lang="en-US" b="1" dirty="0"/>
+          </a:p>
+          <a:p>
+            <a:r>
               <a:rPr lang="en-US" dirty="0" smtClean="0">
                 <a:solidFill>
-                  <a:schemeClr val="accent2">
-                    <a:lumMod val="50000"/>
+                  <a:schemeClr val="accent6">
+                    <a:lumMod val="75000"/>
                   </a:schemeClr>
                 </a:solidFill>
               </a:rPr>
-              <a:t>Argument/Parameter</a:t>
+              <a:t>G</a:t>
+            </a:r>
+            <a:r>
+              <a:rPr lang="en-US" dirty="0" smtClean="0">
+                <a:solidFill>
+                  <a:srgbClr val="C00000"/>
+                </a:solidFill>
+              </a:rPr>
+              <a:t>o</a:t>
+            </a:r>
+            <a:r>
+              <a:rPr lang="en-US" dirty="0" smtClean="0">
+                <a:solidFill>
+                  <a:srgbClr val="FFC000"/>
+                </a:solidFill>
+              </a:rPr>
+              <a:t>o</a:t>
+            </a:r>
+            <a:r>
+              <a:rPr lang="en-US" dirty="0" smtClean="0">
+                <a:solidFill>
+                  <a:schemeClr val="accent6">
+                    <a:lumMod val="75000"/>
+                  </a:schemeClr>
+                </a:solidFill>
+              </a:rPr>
+              <a:t>g</a:t>
+            </a:r>
+            <a:r>
+              <a:rPr lang="en-US" dirty="0" smtClean="0">
+                <a:solidFill>
+                  <a:srgbClr val="92D050"/>
+                </a:solidFill>
+              </a:rPr>
+              <a:t>l</a:t>
+            </a:r>
+            <a:r>
+              <a:rPr lang="en-US" dirty="0" smtClean="0">
+                <a:solidFill>
+                  <a:srgbClr val="C00000"/>
+                </a:solidFill>
+              </a:rPr>
+              <a:t>e</a:t>
+            </a:r>
+            <a:r>
+              <a:rPr lang="en-US" dirty="0" smtClean="0"/>
+              <a:t> is your friend, but you may need to adjust your searches a bit.</a:t>
             </a:r>
           </a:p>
           <a:p>
             <a:pPr lvl="1"/>
             <a:r>
               <a:rPr lang="en-US" dirty="0" smtClean="0"/>
-              <a:t>Variable data passed into a function or script to provide the context and information for the code</a:t>
-            </a:r>
-          </a:p>
-          <a:p>
-            <a:r>
-              <a:rPr lang="en-US" dirty="0" smtClean="0">
-                <a:solidFill>
-                  <a:schemeClr val="accent2">
-                    <a:lumMod val="50000"/>
-                  </a:schemeClr>
-                </a:solidFill>
-              </a:rPr>
-              <a:t>Exception</a:t>
+              <a:t>Language and version (Python 2.6)</a:t>
             </a:r>
           </a:p>
           <a:p>
             <a:pPr lvl="1"/>
             <a:r>
               <a:rPr lang="en-US" dirty="0" smtClean="0"/>
-              <a:t>An unexpected condition in the program - difficult to recover from without additional coding to handle them. For our purposes, a crash</a:t>
-            </a:r>
-          </a:p>
-          <a:p>
-            <a:r>
-              <a:rPr lang="en-US" dirty="0" smtClean="0">
-                <a:solidFill>
-                  <a:schemeClr val="accent2">
-                    <a:lumMod val="50000"/>
-                  </a:schemeClr>
-                </a:solidFill>
-              </a:rPr>
-              <a:t>Comment</a:t>
+              <a:t>Major package (</a:t>
+            </a:r>
+            <a:r>
+              <a:rPr lang="en-US" dirty="0" err="1" smtClean="0"/>
+              <a:t>arcpy</a:t>
+            </a:r>
+            <a:r>
+              <a:rPr lang="en-US" dirty="0" smtClean="0"/>
+              <a:t>)</a:t>
             </a:r>
           </a:p>
           <a:p>
             <a:pPr lvl="1"/>
             <a:r>
               <a:rPr lang="en-US" dirty="0" smtClean="0"/>
-              <a:t>Embedded, non-code English (or other human language) explanations of what is contained in the code.</a:t>
+              <a:t>Error codes or descriptions (“’</a:t>
+            </a:r>
+            <a:r>
+              <a:rPr lang="en-US" dirty="0" err="1" smtClean="0"/>
+              <a:t>NoneType</a:t>
+            </a:r>
+            <a:r>
+              <a:rPr lang="en-US" dirty="0" smtClean="0"/>
+              <a:t>’ object has no attribute”)</a:t>
+            </a:r>
+          </a:p>
+          <a:p>
+            <a:r>
+              <a:rPr lang="en-US" dirty="0" smtClean="0"/>
+              <a:t>Comment your code – it really helps. Seriously.</a:t>
             </a:r>
             <a:endParaRPr lang="en-US" dirty="0"/>
           </a:p>
@@ -4747,7 +4761,7 @@
     </p:spTree>
     <p:extLst>
       <p:ext uri="{BB962C8B-B14F-4D97-AF65-F5344CB8AC3E}">
-        <p14:creationId xmlns:p14="http://schemas.microsoft.com/office/powerpoint/2010/main" val="1953321995"/>
+        <p14:creationId xmlns:p14="http://schemas.microsoft.com/office/powerpoint/2010/main" val="3472779554"/>
       </p:ext>
     </p:extLst>
   </p:cSld>
@@ -4797,10 +4811,10 @@
           <a:lstStyle/>
           <a:p>
             <a:r>
-              <a:rPr lang="en-US" smtClean="0"/>
-              <a:t>Failing Gracefully</a:t>
-            </a:r>
-            <a:endParaRPr lang="en-US"/>
+              <a:rPr lang="en-US" dirty="0" smtClean="0"/>
+              <a:t>Conventions</a:t>
+            </a:r>
+            <a:endParaRPr lang="en-US" dirty="0"/>
           </a:p>
         </p:txBody>
       </p:sp>
@@ -4814,138 +4828,109 @@
             <p:ph idx="1"/>
           </p:nvPr>
         </p:nvSpPr>
-        <p:spPr/>
+        <p:spPr>
+          <a:xfrm>
+            <a:off x="457200" y="1219200"/>
+            <a:ext cx="8534400" cy="5486400"/>
+          </a:xfrm>
+        </p:spPr>
         <p:txBody>
-          <a:bodyPr>
-            <a:normAutofit lnSpcReduction="10000"/>
-          </a:bodyPr>
+          <a:bodyPr/>
           <a:lstStyle/>
           <a:p>
             <a:r>
               <a:rPr lang="en-US" dirty="0" smtClean="0"/>
-              <a:t>Rule #1 of programs is – they </a:t>
-            </a:r>
-            <a:r>
-              <a:rPr lang="en-US" i="1" dirty="0" smtClean="0"/>
-              <a:t>break</a:t>
-            </a:r>
+              <a:t>Python code blocks are defined by indentation</a:t>
+            </a:r>
+          </a:p>
+          <a:p>
+            <a:pPr lvl="1"/>
             <a:r>
               <a:rPr lang="en-US" dirty="0" smtClean="0"/>
-              <a:t>, and never work on the first try.</a:t>
+              <a:t>Statements that start a new block end with a colon</a:t>
+            </a:r>
+          </a:p>
+          <a:p>
+            <a:r>
+              <a:rPr lang="en-US" dirty="0" smtClean="0"/>
+              <a:t>import statements usually occur at the top</a:t>
+            </a:r>
+          </a:p>
+          <a:p>
+            <a:r>
+              <a:rPr lang="en-US" dirty="0" smtClean="0"/>
+              <a:t>Dot Notation and nesting</a:t>
             </a:r>
           </a:p>
           <a:p>
             <a:pPr lvl="1"/>
             <a:r>
+              <a:rPr lang="en-US" b="1" dirty="0" err="1" smtClean="0"/>
+              <a:t>os.getcwd</a:t>
+            </a:r>
+            <a:r>
+              <a:rPr lang="en-US" b="1" dirty="0" smtClean="0"/>
+              <a:t>() </a:t>
+            </a:r>
+            <a:r>
               <a:rPr lang="en-US" dirty="0" smtClean="0"/>
-              <a:t>So, we go back to </a:t>
+              <a:t>refers to function </a:t>
+            </a:r>
+            <a:r>
+              <a:rPr lang="en-US" b="1" dirty="0" err="1" smtClean="0"/>
+              <a:t>getcwd</a:t>
             </a:r>
             <a:r>
               <a:rPr lang="en-US" b="1" dirty="0" smtClean="0"/>
-              <a:t>debugging</a:t>
-            </a:r>
-            <a:endParaRPr lang="en-US" b="1" dirty="0"/>
-          </a:p>
-          <a:p>
-            <a:r>
-              <a:rPr lang="en-US" dirty="0" smtClean="0">
-                <a:solidFill>
-                  <a:schemeClr val="accent6">
-                    <a:lumMod val="75000"/>
-                  </a:schemeClr>
-                </a:solidFill>
-              </a:rPr>
-              <a:t>G</a:t>
-            </a:r>
-            <a:r>
-              <a:rPr lang="en-US" dirty="0" smtClean="0">
-                <a:solidFill>
-                  <a:srgbClr val="C00000"/>
-                </a:solidFill>
-              </a:rPr>
-              <a:t>o</a:t>
-            </a:r>
-            <a:r>
-              <a:rPr lang="en-US" dirty="0" smtClean="0">
-                <a:solidFill>
-                  <a:srgbClr val="FFC000"/>
-                </a:solidFill>
-              </a:rPr>
-              <a:t>o</a:t>
-            </a:r>
-            <a:r>
-              <a:rPr lang="en-US" dirty="0" smtClean="0">
-                <a:solidFill>
-                  <a:schemeClr val="accent6">
-                    <a:lumMod val="75000"/>
-                  </a:schemeClr>
-                </a:solidFill>
-              </a:rPr>
-              <a:t>g</a:t>
-            </a:r>
-            <a:r>
-              <a:rPr lang="en-US" dirty="0" smtClean="0">
-                <a:solidFill>
-                  <a:srgbClr val="92D050"/>
-                </a:solidFill>
-              </a:rPr>
-              <a:t>l</a:t>
-            </a:r>
-            <a:r>
-              <a:rPr lang="en-US" dirty="0" smtClean="0">
-                <a:solidFill>
-                  <a:srgbClr val="C00000"/>
-                </a:solidFill>
-              </a:rPr>
-              <a:t>e</a:t>
+              <a:t>()</a:t>
             </a:r>
             <a:r>
               <a:rPr lang="en-US" dirty="0" smtClean="0"/>
-              <a:t> is your friend, but you may need to adjust your searches a bit.</a:t>
-            </a:r>
+              <a:t> in package </a:t>
+            </a:r>
+            <a:r>
+              <a:rPr lang="en-US" b="1" dirty="0" err="1" smtClean="0"/>
+              <a:t>os</a:t>
+            </a:r>
+            <a:endParaRPr lang="en-US" b="1" dirty="0" smtClean="0"/>
           </a:p>
           <a:p>
             <a:pPr lvl="1"/>
             <a:r>
+              <a:rPr lang="en-US" b="1" dirty="0" err="1" smtClean="0"/>
+              <a:t>os.path.join</a:t>
+            </a:r>
+            <a:r>
+              <a:rPr lang="en-US" b="1" dirty="0" smtClean="0"/>
+              <a:t>()</a:t>
+            </a:r>
+            <a:r>
               <a:rPr lang="en-US" dirty="0" smtClean="0"/>
-              <a:t>Language and version (Python 2.6)</a:t>
-            </a:r>
-          </a:p>
-          <a:p>
-            <a:pPr lvl="1"/>
+              <a:t> refers to function </a:t>
+            </a:r>
+            <a:r>
+              <a:rPr lang="en-US" b="1" dirty="0" smtClean="0"/>
+              <a:t>join() </a:t>
+            </a:r>
             <a:r>
               <a:rPr lang="en-US" dirty="0" smtClean="0"/>
-              <a:t>Major package (</a:t>
-            </a:r>
-            <a:r>
-              <a:rPr lang="en-US" dirty="0" err="1" smtClean="0"/>
-              <a:t>arcpy</a:t>
+              <a:t>in module </a:t>
+            </a:r>
+            <a:r>
+              <a:rPr lang="en-US" b="1" dirty="0" smtClean="0"/>
+              <a:t>path</a:t>
             </a:r>
             <a:r>
               <a:rPr lang="en-US" dirty="0" smtClean="0"/>
-              <a:t>)</a:t>
-            </a:r>
-          </a:p>
-          <a:p>
-            <a:pPr lvl="1"/>
-            <a:r>
-              <a:rPr lang="en-US" dirty="0" smtClean="0"/>
-              <a:t>Error codes or descriptions (“’</a:t>
-            </a:r>
-            <a:r>
-              <a:rPr lang="en-US" dirty="0" err="1" smtClean="0"/>
-              <a:t>NoneType</a:t>
-            </a:r>
-            <a:r>
-              <a:rPr lang="en-US" dirty="0" smtClean="0"/>
-              <a:t>’ object has no attribute”)</a:t>
-            </a:r>
-          </a:p>
-          <a:p>
-            <a:r>
-              <a:rPr lang="en-US" dirty="0" smtClean="0"/>
-              <a:t>Comment your code – it really helps. Seriously.</a:t>
-            </a:r>
+              <a:t> in package </a:t>
+            </a:r>
+            <a:r>
+              <a:rPr lang="en-US" b="1" dirty="0" err="1" smtClean="0"/>
+              <a:t>os</a:t>
+            </a:r>
+            <a:endParaRPr lang="en-US" b="1" dirty="0" smtClean="0"/>
+          </a:p>
+          <a:p>
             <a:endParaRPr lang="en-US" dirty="0"/>
           </a:p>
         </p:txBody>
@@ -4953,7 +4938,7 @@
     </p:spTree>
     <p:extLst>
       <p:ext uri="{BB962C8B-B14F-4D97-AF65-F5344CB8AC3E}">
-        <p14:creationId xmlns:p14="http://schemas.microsoft.com/office/powerpoint/2010/main" val="3472779554"/>
+        <p14:creationId xmlns:p14="http://schemas.microsoft.com/office/powerpoint/2010/main" val="344296630"/>
       </p:ext>
     </p:extLst>
   </p:cSld>
@@ -5574,7 +5559,7 @@
         </p:nvGrpSpPr>
         <p:grpSpPr>
           <a:xfrm>
-            <a:off x="1131276" y="3212068"/>
+            <a:off x="952500" y="3212068"/>
             <a:ext cx="6603025" cy="750332"/>
             <a:chOff x="1131276" y="3212068"/>
             <a:chExt cx="6603025" cy="750332"/>
@@ -5725,16 +5710,16 @@
       </p:grpSp>
       <p:grpSp>
         <p:nvGrpSpPr>
-          <p:cNvPr id="33" name="Group 32"/>
+          <p:cNvPr id="10" name="Group 9"/>
           <p:cNvGrpSpPr/>
           <p:nvPr/>
         </p:nvGrpSpPr>
         <p:grpSpPr>
           <a:xfrm>
-            <a:off x="952500" y="1219200"/>
-            <a:ext cx="7594600" cy="1087397"/>
-            <a:chOff x="952500" y="1219200"/>
-            <a:chExt cx="7594600" cy="1087397"/>
+            <a:off x="922020" y="1219200"/>
+            <a:ext cx="7625080" cy="1077106"/>
+            <a:chOff x="922020" y="1219200"/>
+            <a:chExt cx="7625080" cy="1077106"/>
           </a:xfrm>
         </p:grpSpPr>
         <p:sp>
@@ -5794,7 +5779,7 @@
           </p:nvSpPr>
           <p:spPr>
             <a:xfrm rot="16200000">
-              <a:off x="2743199" y="1239797"/>
+              <a:off x="1836420" y="1229506"/>
               <a:ext cx="152401" cy="1981200"/>
             </a:xfrm>
             <a:prstGeom prst="rightBrace">
@@ -5874,7 +5859,7 @@
           </p:nvSpPr>
           <p:spPr>
             <a:xfrm>
-              <a:off x="1828799" y="1780059"/>
+              <a:off x="922020" y="1769768"/>
               <a:ext cx="1981201" cy="369332"/>
             </a:xfrm>
             <a:prstGeom prst="rect">
@@ -5905,8 +5890,8 @@
           </p:nvSpPr>
           <p:spPr>
             <a:xfrm rot="16200000">
-              <a:off x="5438003" y="505598"/>
-              <a:ext cx="172999" cy="3429000"/>
+              <a:off x="3971218" y="1062056"/>
+              <a:ext cx="166256" cy="2302243"/>
             </a:xfrm>
             <a:prstGeom prst="rightBrace">
               <a:avLst>
@@ -5954,7 +5939,7 @@
           </p:nvSpPr>
           <p:spPr>
             <a:xfrm>
-              <a:off x="4533901" y="1771010"/>
+              <a:off x="3098031" y="1792127"/>
               <a:ext cx="1981201" cy="369332"/>
             </a:xfrm>
             <a:prstGeom prst="rect">
@@ -5987,9 +5972,9 @@
         <p:grpSpPr>
           <a:xfrm>
             <a:off x="-76200" y="4231282"/>
-            <a:ext cx="8686800" cy="1150779"/>
+            <a:ext cx="8570965" cy="1150779"/>
             <a:chOff x="-76200" y="4231282"/>
-            <a:chExt cx="8686800" cy="1150779"/>
+            <a:chExt cx="8570965" cy="1150779"/>
           </a:xfrm>
         </p:grpSpPr>
         <p:sp>
@@ -6077,7 +6062,7 @@
           </p:nvCxnSpPr>
           <p:spPr>
             <a:xfrm>
-              <a:off x="7162800" y="4953000"/>
+              <a:off x="6184900" y="4965504"/>
               <a:ext cx="228600" cy="0"/>
             </a:xfrm>
             <a:prstGeom prst="line">
@@ -6115,7 +6100,7 @@
           </p:nvCxnSpPr>
           <p:spPr>
             <a:xfrm>
-              <a:off x="5943600" y="5215354"/>
+              <a:off x="4965700" y="5227858"/>
               <a:ext cx="1447800" cy="0"/>
             </a:xfrm>
             <a:prstGeom prst="line">
@@ -6153,7 +6138,7 @@
           </p:nvSpPr>
           <p:spPr>
             <a:xfrm>
-              <a:off x="7340600" y="4876800"/>
+              <a:off x="6362700" y="4889304"/>
               <a:ext cx="1270000" cy="369332"/>
             </a:xfrm>
             <a:prstGeom prst="rect">
@@ -6264,7 +6249,7 @@
         </p:nvGrpSpPr>
         <p:grpSpPr>
           <a:xfrm>
-            <a:off x="2552701" y="5562600"/>
+            <a:off x="1912620" y="5568370"/>
             <a:ext cx="2652764" cy="417732"/>
             <a:chOff x="2552701" y="5562600"/>
             <a:chExt cx="2652764" cy="417732"/>
@@ -6415,7 +6400,7 @@
                             </p:stCondLst>
                             <p:childTnLst>
                               <p:par>
-                                <p:cTn id="9" presetID="1" presetClass="entr" presetSubtype="0" fill="hold" nodeType="clickEffect">
+                                <p:cTn id="9" presetID="1" presetClass="entr" presetSubtype="0" fill="hold" grpId="0" nodeType="clickEffect">
                                   <p:stCondLst>
                                     <p:cond delay="0"/>
                                   </p:stCondLst>
@@ -6428,7 +6413,11 @@
                                           </p:stCondLst>
                                         </p:cTn>
                                         <p:tgtEl>
-                                          <p:spTgt spid="33"/>
+                                          <p:spTgt spid="3">
+                                            <p:txEl>
+                                              <p:pRg st="3" end="3"/>
+                                            </p:txEl>
+                                          </p:spTgt>
                                         </p:tgtEl>
                                         <p:attrNameLst>
                                           <p:attrName>style.visibility</p:attrName>
@@ -6473,11 +6462,7 @@
                                           </p:stCondLst>
                                         </p:cTn>
                                         <p:tgtEl>
-                                          <p:spTgt spid="3">
-                                            <p:txEl>
-                                              <p:pRg st="3" end="3"/>
-                                            </p:txEl>
-                                          </p:spTgt>
+                                          <p:spTgt spid="7"/>
                                         </p:tgtEl>
                                         <p:attrNameLst>
                                           <p:attrName>style.visibility</p:attrName>
@@ -6509,7 +6494,7 @@
                             </p:stCondLst>
                             <p:childTnLst>
                               <p:par>
-                                <p:cTn id="17" presetID="1" presetClass="entr" presetSubtype="0" fill="hold" grpId="0" nodeType="clickEffect">
+                                <p:cTn id="17" presetID="1" presetClass="entr" presetSubtype="0" fill="hold" nodeType="clickEffect">
                                   <p:stCondLst>
                                     <p:cond delay="0"/>
                                   </p:stCondLst>
@@ -6522,7 +6507,7 @@
                                           </p:stCondLst>
                                         </p:cTn>
                                         <p:tgtEl>
-                                          <p:spTgt spid="7"/>
+                                          <p:spTgt spid="34"/>
                                         </p:tgtEl>
                                         <p:attrNameLst>
                                           <p:attrName>style.visibility</p:attrName>
@@ -6554,7 +6539,7 @@
                             </p:stCondLst>
                             <p:childTnLst>
                               <p:par>
-                                <p:cTn id="21" presetID="1" presetClass="entr" presetSubtype="0" fill="hold" nodeType="clickEffect">
+                                <p:cTn id="21" presetID="1" presetClass="entr" presetSubtype="0" fill="hold" grpId="0" nodeType="clickEffect">
                                   <p:stCondLst>
                                     <p:cond delay="0"/>
                                   </p:stCondLst>
@@ -6567,7 +6552,11 @@
                                           </p:stCondLst>
                                         </p:cTn>
                                         <p:tgtEl>
-                                          <p:spTgt spid="34"/>
+                                          <p:spTgt spid="3">
+                                            <p:txEl>
+                                              <p:pRg st="5" end="5"/>
+                                            </p:txEl>
+                                          </p:spTgt>
                                         </p:tgtEl>
                                         <p:attrNameLst>
                                           <p:attrName>style.visibility</p:attrName>
@@ -6612,11 +6601,7 @@
                                           </p:stCondLst>
                                         </p:cTn>
                                         <p:tgtEl>
-                                          <p:spTgt spid="3">
-                                            <p:txEl>
-                                              <p:pRg st="5" end="5"/>
-                                            </p:txEl>
-                                          </p:spTgt>
+                                          <p:spTgt spid="11"/>
                                         </p:tgtEl>
                                         <p:attrNameLst>
                                           <p:attrName>style.visibility</p:attrName>
@@ -6648,7 +6633,7 @@
                             </p:stCondLst>
                             <p:childTnLst>
                               <p:par>
-                                <p:cTn id="29" presetID="1" presetClass="entr" presetSubtype="0" fill="hold" grpId="0" nodeType="clickEffect">
+                                <p:cTn id="29" presetID="1" presetClass="entr" presetSubtype="0" fill="hold" nodeType="clickEffect">
                                   <p:stCondLst>
                                     <p:cond delay="0"/>
                                   </p:stCondLst>
@@ -6661,7 +6646,7 @@
                                           </p:stCondLst>
                                         </p:cTn>
                                         <p:tgtEl>
-                                          <p:spTgt spid="11"/>
+                                          <p:spTgt spid="35"/>
                                         </p:tgtEl>
                                         <p:attrNameLst>
                                           <p:attrName>style.visibility</p:attrName>
@@ -6693,7 +6678,7 @@
                             </p:stCondLst>
                             <p:childTnLst>
                               <p:par>
-                                <p:cTn id="33" presetID="1" presetClass="entr" presetSubtype="0" fill="hold" nodeType="clickEffect">
+                                <p:cTn id="33" presetID="1" presetClass="entr" presetSubtype="0" fill="hold" grpId="0" nodeType="clickEffect">
                                   <p:stCondLst>
                                     <p:cond delay="0"/>
                                   </p:stCondLst>
@@ -6706,7 +6691,11 @@
                                           </p:stCondLst>
                                         </p:cTn>
                                         <p:tgtEl>
-                                          <p:spTgt spid="35"/>
+                                          <p:spTgt spid="3">
+                                            <p:txEl>
+                                              <p:pRg st="7" end="7"/>
+                                            </p:txEl>
+                                          </p:spTgt>
                                         </p:tgtEl>
                                         <p:attrNameLst>
                                           <p:attrName>style.visibility</p:attrName>
@@ -6751,11 +6740,7 @@
                                           </p:stCondLst>
                                         </p:cTn>
                                         <p:tgtEl>
-                                          <p:spTgt spid="3">
-                                            <p:txEl>
-                                              <p:pRg st="7" end="7"/>
-                                            </p:txEl>
-                                          </p:spTgt>
+                                          <p:spTgt spid="12"/>
                                         </p:tgtEl>
                                         <p:attrNameLst>
                                           <p:attrName>style.visibility</p:attrName>
@@ -6787,7 +6772,7 @@
                             </p:stCondLst>
                             <p:childTnLst>
                               <p:par>
-                                <p:cTn id="41" presetID="1" presetClass="entr" presetSubtype="0" fill="hold" grpId="0" nodeType="clickEffect">
+                                <p:cTn id="41" presetID="1" presetClass="entr" presetSubtype="0" fill="hold" nodeType="clickEffect">
                                   <p:stCondLst>
                                     <p:cond delay="0"/>
                                   </p:stCondLst>
@@ -6795,51 +6780,6 @@
                                     <p:set>
                                       <p:cBhvr>
                                         <p:cTn id="42" dur="1" fill="hold">
-                                          <p:stCondLst>
-                                            <p:cond delay="0"/>
-                                          </p:stCondLst>
-                                        </p:cTn>
-                                        <p:tgtEl>
-                                          <p:spTgt spid="12"/>
-                                        </p:tgtEl>
-                                        <p:attrNameLst>
-                                          <p:attrName>style.visibility</p:attrName>
-                                        </p:attrNameLst>
-                                      </p:cBhvr>
-                                      <p:to>
-                                        <p:strVal val="visible"/>
-                                      </p:to>
-                                    </p:set>
-                                  </p:childTnLst>
-                                </p:cTn>
-                              </p:par>
-                            </p:childTnLst>
-                          </p:cTn>
-                        </p:par>
-                      </p:childTnLst>
-                    </p:cTn>
-                  </p:par>
-                  <p:par>
-                    <p:cTn id="43" fill="hold">
-                      <p:stCondLst>
-                        <p:cond delay="indefinite"/>
-                      </p:stCondLst>
-                      <p:childTnLst>
-                        <p:par>
-                          <p:cTn id="44" fill="hold">
-                            <p:stCondLst>
-                              <p:cond delay="0"/>
-                            </p:stCondLst>
-                            <p:childTnLst>
-                              <p:par>
-                                <p:cTn id="45" presetID="1" presetClass="entr" presetSubtype="0" fill="hold" nodeType="clickEffect">
-                                  <p:stCondLst>
-                                    <p:cond delay="0"/>
-                                  </p:stCondLst>
-                                  <p:childTnLst>
-                                    <p:set>
-                                      <p:cBhvr>
-                                        <p:cTn id="46" dur="1" fill="hold">
                                           <p:stCondLst>
                                             <p:cond delay="0"/>
                                           </p:stCondLst>
@@ -8096,183 +8036,6 @@
 </p:sld>
 </file>
 
-<file path=ppt/slides/slide16.xml><?xml version="1.0" encoding="utf-8"?>
-<p:sld xmlns:a="http://schemas.openxmlformats.org/drawingml/2006/main" xmlns:r="http://schemas.openxmlformats.org/officeDocument/2006/relationships" xmlns:p="http://schemas.openxmlformats.org/presentationml/2006/main">
-  <p:cSld>
-    <p:spTree>
-      <p:nvGrpSpPr>
-        <p:cNvPr id="1" name=""/>
-        <p:cNvGrpSpPr/>
-        <p:nvPr/>
-      </p:nvGrpSpPr>
-      <p:grpSpPr>
-        <a:xfrm>
-          <a:off x="0" y="0"/>
-          <a:ext cx="0" cy="0"/>
-          <a:chOff x="0" y="0"/>
-          <a:chExt cx="0" cy="0"/>
-        </a:xfrm>
-      </p:grpSpPr>
-      <p:sp>
-        <p:nvSpPr>
-          <p:cNvPr id="2" name="Title 1"/>
-          <p:cNvSpPr>
-            <a:spLocks noGrp="1"/>
-          </p:cNvSpPr>
-          <p:nvPr>
-            <p:ph type="title"/>
-          </p:nvPr>
-        </p:nvSpPr>
-        <p:spPr/>
-        <p:txBody>
-          <a:bodyPr/>
-          <a:lstStyle/>
-          <a:p>
-            <a:r>
-              <a:rPr lang="en-US" dirty="0" smtClean="0"/>
-              <a:t>Conventions</a:t>
-            </a:r>
-            <a:endParaRPr lang="en-US" dirty="0"/>
-          </a:p>
-        </p:txBody>
-      </p:sp>
-      <p:sp>
-        <p:nvSpPr>
-          <p:cNvPr id="3" name="Content Placeholder 2"/>
-          <p:cNvSpPr>
-            <a:spLocks noGrp="1"/>
-          </p:cNvSpPr>
-          <p:nvPr>
-            <p:ph idx="1"/>
-          </p:nvPr>
-        </p:nvSpPr>
-        <p:spPr>
-          <a:xfrm>
-            <a:off x="457200" y="1219200"/>
-            <a:ext cx="8534400" cy="5486400"/>
-          </a:xfrm>
-        </p:spPr>
-        <p:txBody>
-          <a:bodyPr/>
-          <a:lstStyle/>
-          <a:p>
-            <a:r>
-              <a:rPr lang="en-US" dirty="0" smtClean="0"/>
-              <a:t>Python code blocks are defined by indentation</a:t>
-            </a:r>
-          </a:p>
-          <a:p>
-            <a:pPr lvl="1"/>
-            <a:r>
-              <a:rPr lang="en-US" dirty="0" smtClean="0"/>
-              <a:t>Statements that start a new block end with a colon</a:t>
-            </a:r>
-          </a:p>
-          <a:p>
-            <a:r>
-              <a:rPr lang="en-US" dirty="0" smtClean="0"/>
-              <a:t>import statements usually occur at the top</a:t>
-            </a:r>
-          </a:p>
-          <a:p>
-            <a:r>
-              <a:rPr lang="en-US" dirty="0" smtClean="0"/>
-              <a:t>Dot Notation and nesting</a:t>
-            </a:r>
-          </a:p>
-          <a:p>
-            <a:pPr lvl="1"/>
-            <a:r>
-              <a:rPr lang="en-US" b="1" dirty="0" err="1" smtClean="0"/>
-              <a:t>os.getcwd</a:t>
-            </a:r>
-            <a:r>
-              <a:rPr lang="en-US" b="1" dirty="0" smtClean="0"/>
-              <a:t>() </a:t>
-            </a:r>
-            <a:r>
-              <a:rPr lang="en-US" dirty="0" smtClean="0"/>
-              <a:t>refers to function </a:t>
-            </a:r>
-            <a:r>
-              <a:rPr lang="en-US" b="1" dirty="0" err="1" smtClean="0"/>
-              <a:t>getcwd</a:t>
-            </a:r>
-            <a:r>
-              <a:rPr lang="en-US" b="1" dirty="0" smtClean="0"/>
-              <a:t>()</a:t>
-            </a:r>
-            <a:r>
-              <a:rPr lang="en-US" dirty="0" smtClean="0"/>
-              <a:t> in package </a:t>
-            </a:r>
-            <a:r>
-              <a:rPr lang="en-US" b="1" dirty="0" err="1" smtClean="0"/>
-              <a:t>os</a:t>
-            </a:r>
-            <a:endParaRPr lang="en-US" b="1" dirty="0" smtClean="0"/>
-          </a:p>
-          <a:p>
-            <a:pPr lvl="1"/>
-            <a:r>
-              <a:rPr lang="en-US" b="1" dirty="0" err="1" smtClean="0"/>
-              <a:t>os.path.join</a:t>
-            </a:r>
-            <a:r>
-              <a:rPr lang="en-US" b="1" dirty="0" smtClean="0"/>
-              <a:t>()</a:t>
-            </a:r>
-            <a:r>
-              <a:rPr lang="en-US" dirty="0" smtClean="0"/>
-              <a:t> refers to function </a:t>
-            </a:r>
-            <a:r>
-              <a:rPr lang="en-US" b="1" dirty="0" smtClean="0"/>
-              <a:t>join() </a:t>
-            </a:r>
-            <a:r>
-              <a:rPr lang="en-US" dirty="0" smtClean="0"/>
-              <a:t>in module </a:t>
-            </a:r>
-            <a:r>
-              <a:rPr lang="en-US" b="1" dirty="0" smtClean="0"/>
-              <a:t>path</a:t>
-            </a:r>
-            <a:r>
-              <a:rPr lang="en-US" dirty="0" smtClean="0"/>
-              <a:t> in package </a:t>
-            </a:r>
-            <a:r>
-              <a:rPr lang="en-US" b="1" dirty="0" err="1" smtClean="0"/>
-              <a:t>os</a:t>
-            </a:r>
-            <a:endParaRPr lang="en-US" b="1" dirty="0" smtClean="0"/>
-          </a:p>
-          <a:p>
-            <a:endParaRPr lang="en-US" dirty="0"/>
-          </a:p>
-        </p:txBody>
-      </p:sp>
-    </p:spTree>
-    <p:extLst>
-      <p:ext uri="{BB962C8B-B14F-4D97-AF65-F5344CB8AC3E}">
-        <p14:creationId xmlns:p14="http://schemas.microsoft.com/office/powerpoint/2010/main" val="344296630"/>
-      </p:ext>
-    </p:extLst>
-  </p:cSld>
-  <p:clrMapOvr>
-    <a:masterClrMapping/>
-  </p:clrMapOvr>
-  <p:timing>
-    <p:tnLst>
-      <p:par>
-        <p:cTn id="1" dur="indefinite" restart="never" nodeType="tmRoot"/>
-      </p:par>
-    </p:tnLst>
-  </p:timing>
-</p:sld>
-</file>
-
 <file path=ppt/slides/slide2.xml><?xml version="1.0" encoding="utf-8"?>
 <p:sld xmlns:a="http://schemas.openxmlformats.org/drawingml/2006/main" xmlns:r="http://schemas.openxmlformats.org/officeDocument/2006/relationships" xmlns:p="http://schemas.openxmlformats.org/presentationml/2006/main">
   <p:cSld>
@@ -8307,7 +8070,7 @@
           <a:p>
             <a:r>
               <a:rPr lang="en-US" dirty="0" smtClean="0"/>
-              <a:t>Secretly a Python Tutorial</a:t>
+              <a:t>Programming?</a:t>
             </a:r>
             <a:endParaRPr lang="en-US" dirty="0"/>
           </a:p>
@@ -8328,18 +8091,9 @@
           <a:bodyPr/>
           <a:lstStyle/>
           <a:p>
-            <a:r>
-              <a:rPr lang="en-US" dirty="0" smtClean="0"/>
-              <a:t>(</a:t>
-            </a:r>
-            <a:r>
-              <a:rPr lang="en-US" dirty="0" err="1" smtClean="0"/>
-              <a:t>shhh</a:t>
-            </a:r>
-            <a:r>
-              <a:rPr lang="en-US" dirty="0" smtClean="0"/>
-              <a:t>!)</a:t>
-            </a:r>
+            <a:pPr marL="0" indent="0">
+              <a:buNone/>
+            </a:pPr>
             <a:endParaRPr lang="en-US" dirty="0"/>
           </a:p>
         </p:txBody>
@@ -8524,6 +8278,937 @@
         </p:nvSpPr>
         <p:spPr/>
         <p:txBody>
+          <a:bodyPr>
+            <a:normAutofit/>
+          </a:bodyPr>
+          <a:lstStyle/>
+          <a:p>
+            <a:r>
+              <a:rPr lang="en-US" dirty="0" smtClean="0"/>
+              <a:t>Most People’s Idea of a Program</a:t>
+            </a:r>
+            <a:endParaRPr lang="en-US" dirty="0"/>
+          </a:p>
+        </p:txBody>
+      </p:sp>
+      <p:sp>
+        <p:nvSpPr>
+          <p:cNvPr id="4" name="TextBox 3"/>
+          <p:cNvSpPr txBox="1"/>
+          <p:nvPr/>
+        </p:nvSpPr>
+        <p:spPr>
+          <a:xfrm>
+            <a:off x="0" y="1143000"/>
+            <a:ext cx="9144000" cy="400110"/>
+          </a:xfrm>
+          <a:prstGeom prst="rect">
+            <a:avLst/>
+          </a:prstGeom>
+          <a:noFill/>
+        </p:spPr>
+        <p:txBody>
+          <a:bodyPr wrap="square" rtlCol="0">
+            <a:spAutoFit/>
+          </a:bodyPr>
+          <a:lstStyle/>
+          <a:p>
+            <a:pPr algn="ctr"/>
+            <a:r>
+              <a:rPr lang="en-US" sz="2000" i="1" dirty="0" smtClean="0"/>
+              <a:t>Or, these days, an “app”</a:t>
+            </a:r>
+            <a:endParaRPr lang="en-US" sz="2000" i="1" dirty="0"/>
+          </a:p>
+        </p:txBody>
+      </p:sp>
+      <p:grpSp>
+        <p:nvGrpSpPr>
+          <p:cNvPr id="19" name="Group 18"/>
+          <p:cNvGrpSpPr/>
+          <p:nvPr/>
+        </p:nvGrpSpPr>
+        <p:grpSpPr>
+          <a:xfrm>
+            <a:off x="2362200" y="1905000"/>
+            <a:ext cx="4256313" cy="3962402"/>
+            <a:chOff x="2623457" y="2362200"/>
+            <a:chExt cx="4256313" cy="3962402"/>
+          </a:xfrm>
+          <a:effectLst>
+            <a:outerShdw blurRad="215900" dist="101600" dir="2700000" algn="tl" rotWithShape="0">
+              <a:prstClr val="black">
+                <a:alpha val="56000"/>
+              </a:prstClr>
+            </a:outerShdw>
+          </a:effectLst>
+        </p:grpSpPr>
+        <p:sp>
+          <p:nvSpPr>
+            <p:cNvPr id="6" name="Rectangle 5"/>
+            <p:cNvSpPr/>
+            <p:nvPr/>
+          </p:nvSpPr>
+          <p:spPr>
+            <a:xfrm>
+              <a:off x="3429000" y="2362200"/>
+              <a:ext cx="3408218" cy="3124200"/>
+            </a:xfrm>
+            <a:prstGeom prst="rect">
+              <a:avLst/>
+            </a:prstGeom>
+          </p:spPr>
+          <p:style>
+            <a:lnRef idx="2">
+              <a:schemeClr val="dk1">
+                <a:shade val="50000"/>
+              </a:schemeClr>
+            </a:lnRef>
+            <a:fillRef idx="1">
+              <a:schemeClr val="dk1"/>
+            </a:fillRef>
+            <a:effectRef idx="0">
+              <a:schemeClr val="dk1"/>
+            </a:effectRef>
+            <a:fontRef idx="minor">
+              <a:schemeClr val="lt1"/>
+            </a:fontRef>
+          </p:style>
+          <p:txBody>
+            <a:bodyPr rtlCol="0" anchor="ctr"/>
+            <a:lstStyle/>
+            <a:p>
+              <a:pPr algn="ctr"/>
+              <a:endParaRPr lang="en-US"/>
+            </a:p>
+          </p:txBody>
+        </p:sp>
+        <p:sp>
+          <p:nvSpPr>
+            <p:cNvPr id="7" name="Isosceles Triangle 6"/>
+            <p:cNvSpPr/>
+            <p:nvPr/>
+          </p:nvSpPr>
+          <p:spPr>
+            <a:xfrm>
+              <a:off x="2623457" y="2362200"/>
+              <a:ext cx="1567543" cy="609600"/>
+            </a:xfrm>
+            <a:prstGeom prst="triangle">
+              <a:avLst/>
+            </a:prstGeom>
+            <a:solidFill>
+              <a:schemeClr val="tx1">
+                <a:lumMod val="85000"/>
+                <a:lumOff val="15000"/>
+              </a:schemeClr>
+            </a:solidFill>
+            <a:ln>
+              <a:solidFill>
+                <a:schemeClr val="tx1">
+                  <a:lumMod val="85000"/>
+                  <a:lumOff val="15000"/>
+                </a:schemeClr>
+              </a:solidFill>
+            </a:ln>
+          </p:spPr>
+          <p:style>
+            <a:lnRef idx="2">
+              <a:schemeClr val="accent1">
+                <a:shade val="50000"/>
+              </a:schemeClr>
+            </a:lnRef>
+            <a:fillRef idx="1">
+              <a:schemeClr val="accent1"/>
+            </a:fillRef>
+            <a:effectRef idx="0">
+              <a:schemeClr val="accent1"/>
+            </a:effectRef>
+            <a:fontRef idx="minor">
+              <a:schemeClr val="lt1"/>
+            </a:fontRef>
+          </p:style>
+          <p:txBody>
+            <a:bodyPr rtlCol="0" anchor="ctr"/>
+            <a:lstStyle/>
+            <a:p>
+              <a:pPr algn="ctr"/>
+              <a:endParaRPr lang="en-US"/>
+            </a:p>
+          </p:txBody>
+        </p:sp>
+        <p:sp>
+          <p:nvSpPr>
+            <p:cNvPr id="10" name="Rectangle 9"/>
+            <p:cNvSpPr/>
+            <p:nvPr/>
+          </p:nvSpPr>
+          <p:spPr>
+            <a:xfrm>
+              <a:off x="3428999" y="2362200"/>
+              <a:ext cx="3408219" cy="609600"/>
+            </a:xfrm>
+            <a:prstGeom prst="rect">
+              <a:avLst/>
+            </a:prstGeom>
+            <a:solidFill>
+              <a:schemeClr val="tx1">
+                <a:lumMod val="85000"/>
+                <a:lumOff val="15000"/>
+              </a:schemeClr>
+            </a:solidFill>
+            <a:ln>
+              <a:solidFill>
+                <a:schemeClr val="tx1">
+                  <a:lumMod val="85000"/>
+                  <a:lumOff val="15000"/>
+                </a:schemeClr>
+              </a:solidFill>
+            </a:ln>
+          </p:spPr>
+          <p:style>
+            <a:lnRef idx="2">
+              <a:schemeClr val="accent1">
+                <a:shade val="50000"/>
+              </a:schemeClr>
+            </a:lnRef>
+            <a:fillRef idx="1">
+              <a:schemeClr val="accent1"/>
+            </a:fillRef>
+            <a:effectRef idx="0">
+              <a:schemeClr val="accent1"/>
+            </a:effectRef>
+            <a:fontRef idx="minor">
+              <a:schemeClr val="lt1"/>
+            </a:fontRef>
+          </p:style>
+          <p:txBody>
+            <a:bodyPr rtlCol="0" anchor="ctr"/>
+            <a:lstStyle/>
+            <a:p>
+              <a:pPr algn="ctr"/>
+              <a:endParaRPr lang="en-US"/>
+            </a:p>
+          </p:txBody>
+        </p:sp>
+        <p:sp>
+          <p:nvSpPr>
+            <p:cNvPr id="11" name="Rectangle 10"/>
+            <p:cNvSpPr/>
+            <p:nvPr/>
+          </p:nvSpPr>
+          <p:spPr>
+            <a:xfrm rot="5400000">
+              <a:off x="5031919" y="3600453"/>
+              <a:ext cx="3086102" cy="609600"/>
+            </a:xfrm>
+            <a:prstGeom prst="rect">
+              <a:avLst/>
+            </a:prstGeom>
+            <a:solidFill>
+              <a:schemeClr val="tx1">
+                <a:lumMod val="85000"/>
+                <a:lumOff val="15000"/>
+              </a:schemeClr>
+            </a:solidFill>
+            <a:ln>
+              <a:solidFill>
+                <a:schemeClr val="tx1">
+                  <a:lumMod val="85000"/>
+                  <a:lumOff val="15000"/>
+                </a:schemeClr>
+              </a:solidFill>
+            </a:ln>
+          </p:spPr>
+          <p:style>
+            <a:lnRef idx="2">
+              <a:schemeClr val="accent1">
+                <a:shade val="50000"/>
+              </a:schemeClr>
+            </a:lnRef>
+            <a:fillRef idx="1">
+              <a:schemeClr val="accent1"/>
+            </a:fillRef>
+            <a:effectRef idx="0">
+              <a:schemeClr val="accent1"/>
+            </a:effectRef>
+            <a:fontRef idx="minor">
+              <a:schemeClr val="lt1"/>
+            </a:fontRef>
+          </p:style>
+          <p:txBody>
+            <a:bodyPr rtlCol="0" anchor="ctr"/>
+            <a:lstStyle/>
+            <a:p>
+              <a:pPr algn="ctr"/>
+              <a:endParaRPr lang="en-US"/>
+            </a:p>
+          </p:txBody>
+        </p:sp>
+        <p:sp>
+          <p:nvSpPr>
+            <p:cNvPr id="9" name="Isosceles Triangle 8"/>
+            <p:cNvSpPr/>
+            <p:nvPr/>
+          </p:nvSpPr>
+          <p:spPr>
+            <a:xfrm rot="5400000">
+              <a:off x="5698670" y="5143503"/>
+              <a:ext cx="1752600" cy="609598"/>
+            </a:xfrm>
+            <a:prstGeom prst="triangle">
+              <a:avLst/>
+            </a:prstGeom>
+            <a:solidFill>
+              <a:schemeClr val="tx1">
+                <a:lumMod val="85000"/>
+                <a:lumOff val="15000"/>
+              </a:schemeClr>
+            </a:solidFill>
+            <a:ln>
+              <a:solidFill>
+                <a:schemeClr val="tx1">
+                  <a:lumMod val="85000"/>
+                  <a:lumOff val="15000"/>
+                </a:schemeClr>
+              </a:solidFill>
+            </a:ln>
+          </p:spPr>
+          <p:style>
+            <a:lnRef idx="2">
+              <a:schemeClr val="accent1">
+                <a:shade val="50000"/>
+              </a:schemeClr>
+            </a:lnRef>
+            <a:fillRef idx="1">
+              <a:schemeClr val="accent1"/>
+            </a:fillRef>
+            <a:effectRef idx="0">
+              <a:schemeClr val="accent1"/>
+            </a:effectRef>
+            <a:fontRef idx="minor">
+              <a:schemeClr val="lt1"/>
+            </a:fontRef>
+          </p:style>
+          <p:txBody>
+            <a:bodyPr rtlCol="0" anchor="ctr"/>
+            <a:lstStyle/>
+            <a:p>
+              <a:pPr algn="ctr"/>
+              <a:endParaRPr lang="en-US"/>
+            </a:p>
+          </p:txBody>
+        </p:sp>
+        <p:cxnSp>
+          <p:nvCxnSpPr>
+            <p:cNvPr id="13" name="Straight Connector 12"/>
+            <p:cNvCxnSpPr/>
+            <p:nvPr/>
+          </p:nvCxnSpPr>
+          <p:spPr>
+            <a:xfrm flipV="1">
+              <a:off x="5133108" y="2362200"/>
+              <a:ext cx="1746662" cy="1752600"/>
+            </a:xfrm>
+            <a:prstGeom prst="line">
+              <a:avLst/>
+            </a:prstGeom>
+            <a:ln w="19050">
+              <a:solidFill>
+                <a:schemeClr val="tx1">
+                  <a:lumMod val="95000"/>
+                  <a:lumOff val="5000"/>
+                </a:schemeClr>
+              </a:solidFill>
+            </a:ln>
+          </p:spPr>
+          <p:style>
+            <a:lnRef idx="1">
+              <a:schemeClr val="accent1"/>
+            </a:lnRef>
+            <a:fillRef idx="0">
+              <a:schemeClr val="accent1"/>
+            </a:fillRef>
+            <a:effectRef idx="0">
+              <a:schemeClr val="accent1"/>
+            </a:effectRef>
+            <a:fontRef idx="minor">
+              <a:schemeClr val="tx1"/>
+            </a:fontRef>
+          </p:style>
+        </p:cxnSp>
+        <p:sp>
+          <p:nvSpPr>
+            <p:cNvPr id="5" name="Rectangle 4"/>
+            <p:cNvSpPr/>
+            <p:nvPr/>
+          </p:nvSpPr>
+          <p:spPr>
+            <a:xfrm>
+              <a:off x="2623457" y="2971800"/>
+              <a:ext cx="3657600" cy="3352800"/>
+            </a:xfrm>
+            <a:prstGeom prst="rect">
+              <a:avLst/>
+            </a:prstGeom>
+          </p:spPr>
+          <p:style>
+            <a:lnRef idx="2">
+              <a:schemeClr val="dk1">
+                <a:shade val="50000"/>
+              </a:schemeClr>
+            </a:lnRef>
+            <a:fillRef idx="1">
+              <a:schemeClr val="dk1"/>
+            </a:fillRef>
+            <a:effectRef idx="0">
+              <a:schemeClr val="dk1"/>
+            </a:effectRef>
+            <a:fontRef idx="minor">
+              <a:schemeClr val="lt1"/>
+            </a:fontRef>
+          </p:style>
+          <p:txBody>
+            <a:bodyPr rtlCol="0" anchor="ctr"/>
+            <a:lstStyle/>
+            <a:p>
+              <a:pPr algn="ctr"/>
+              <a:endParaRPr lang="en-US"/>
+            </a:p>
+          </p:txBody>
+        </p:sp>
+      </p:grpSp>
+    </p:spTree>
+    <p:extLst>
+      <p:ext uri="{BB962C8B-B14F-4D97-AF65-F5344CB8AC3E}">
+        <p14:creationId xmlns:p14="http://schemas.microsoft.com/office/powerpoint/2010/main" val="2466324471"/>
+      </p:ext>
+    </p:extLst>
+  </p:cSld>
+  <p:clrMapOvr>
+    <a:masterClrMapping/>
+  </p:clrMapOvr>
+  <p:timing>
+    <p:tnLst>
+      <p:par>
+        <p:cTn id="1" dur="indefinite" restart="never" nodeType="tmRoot"/>
+      </p:par>
+    </p:tnLst>
+  </p:timing>
+</p:sld>
+</file>
+
+<file path=ppt/slides/slide4.xml><?xml version="1.0" encoding="utf-8"?>
+<p:sld xmlns:a="http://schemas.openxmlformats.org/drawingml/2006/main" xmlns:r="http://schemas.openxmlformats.org/officeDocument/2006/relationships" xmlns:p="http://schemas.openxmlformats.org/presentationml/2006/main">
+  <p:cSld>
+    <p:spTree>
+      <p:nvGrpSpPr>
+        <p:cNvPr id="1" name=""/>
+        <p:cNvGrpSpPr/>
+        <p:nvPr/>
+      </p:nvGrpSpPr>
+      <p:grpSpPr>
+        <a:xfrm>
+          <a:off x="0" y="0"/>
+          <a:ext cx="0" cy="0"/>
+          <a:chOff x="0" y="0"/>
+          <a:chExt cx="0" cy="0"/>
+        </a:xfrm>
+      </p:grpSpPr>
+      <p:sp>
+        <p:nvSpPr>
+          <p:cNvPr id="2" name="Title 1"/>
+          <p:cNvSpPr>
+            <a:spLocks noGrp="1"/>
+          </p:cNvSpPr>
+          <p:nvPr>
+            <p:ph type="title"/>
+          </p:nvPr>
+        </p:nvSpPr>
+        <p:spPr/>
+        <p:txBody>
+          <a:bodyPr>
+            <a:normAutofit/>
+          </a:bodyPr>
+          <a:lstStyle/>
+          <a:p>
+            <a:r>
+              <a:rPr lang="en-US" dirty="0" smtClean="0"/>
+              <a:t>A </a:t>
+            </a:r>
+            <a:r>
+              <a:rPr lang="en-US" i="1" dirty="0" smtClean="0"/>
+              <a:t>maybe</a:t>
+            </a:r>
+            <a:r>
+              <a:rPr lang="en-US" dirty="0" smtClean="0"/>
+              <a:t> more accurate picture</a:t>
+            </a:r>
+            <a:endParaRPr lang="en-US" dirty="0"/>
+          </a:p>
+        </p:txBody>
+      </p:sp>
+      <p:sp>
+        <p:nvSpPr>
+          <p:cNvPr id="5" name="TextBox 4"/>
+          <p:cNvSpPr txBox="1"/>
+          <p:nvPr/>
+        </p:nvSpPr>
+        <p:spPr>
+          <a:xfrm>
+            <a:off x="2286000" y="5879070"/>
+            <a:ext cx="5105400" cy="369332"/>
+          </a:xfrm>
+          <a:prstGeom prst="rect">
+            <a:avLst/>
+          </a:prstGeom>
+          <a:noFill/>
+        </p:spPr>
+        <p:txBody>
+          <a:bodyPr wrap="square" rtlCol="0">
+            <a:spAutoFit/>
+          </a:bodyPr>
+          <a:lstStyle/>
+          <a:p>
+            <a:r>
+              <a:rPr lang="en-US" dirty="0" err="1" smtClean="0"/>
+              <a:t>TinkerToy</a:t>
+            </a:r>
+            <a:r>
+              <a:rPr lang="en-US" dirty="0" smtClean="0"/>
+              <a:t> Source: </a:t>
+            </a:r>
+            <a:r>
+              <a:rPr lang="en-US" dirty="0" smtClean="0">
+                <a:hlinkClick r:id="rId3"/>
+              </a:rPr>
+              <a:t>Wikimedia Commons</a:t>
+            </a:r>
+            <a:endParaRPr lang="en-US" dirty="0"/>
+          </a:p>
+        </p:txBody>
+      </p:sp>
+      <p:grpSp>
+        <p:nvGrpSpPr>
+          <p:cNvPr id="3" name="Group 2"/>
+          <p:cNvGrpSpPr/>
+          <p:nvPr/>
+        </p:nvGrpSpPr>
+        <p:grpSpPr>
+          <a:xfrm>
+            <a:off x="2220687" y="1905000"/>
+            <a:ext cx="4408713" cy="3962402"/>
+            <a:chOff x="1828800" y="1531380"/>
+            <a:chExt cx="4408713" cy="3962402"/>
+          </a:xfrm>
+        </p:grpSpPr>
+        <p:pic>
+          <p:nvPicPr>
+            <p:cNvPr id="1026" name="Picture 2" descr="http://upload.wikimedia.org/wikipedia/commons/b/b3/Tinkertoy_300126232168_.JPG"/>
+            <p:cNvPicPr>
+              <a:picLocks noChangeAspect="1" noChangeArrowheads="1"/>
+            </p:cNvPicPr>
+            <p:nvPr/>
+          </p:nvPicPr>
+          <p:blipFill rotWithShape="1">
+            <a:blip r:embed="rId4">
+              <a:extLst>
+                <a:ext uri="{28A0092B-C50C-407E-A947-70E740481C1C}">
+                  <a14:useLocalDpi xmlns:a14="http://schemas.microsoft.com/office/drawing/2010/main" val="0"/>
+                </a:ext>
+              </a:extLst>
+            </a:blip>
+            <a:srcRect l="-3201" t="-695" r="26066" b="11830"/>
+            <a:stretch/>
+          </p:blipFill>
+          <p:spPr bwMode="auto">
+            <a:xfrm>
+              <a:off x="1828800" y="2114548"/>
+              <a:ext cx="3815938" cy="3379234"/>
+            </a:xfrm>
+            <a:prstGeom prst="rect">
+              <a:avLst/>
+            </a:prstGeom>
+            <a:noFill/>
+            <a:extLst>
+              <a:ext uri="{909E8E84-426E-40DD-AFC4-6F175D3DCCD1}">
+                <a14:hiddenFill xmlns:a14="http://schemas.microsoft.com/office/drawing/2010/main">
+                  <a:solidFill>
+                    <a:srgbClr val="FFFFFF"/>
+                  </a:solidFill>
+                </a14:hiddenFill>
+              </a:ext>
+            </a:extLst>
+          </p:spPr>
+        </p:pic>
+        <p:grpSp>
+          <p:nvGrpSpPr>
+            <p:cNvPr id="7" name="Group 6"/>
+            <p:cNvGrpSpPr/>
+            <p:nvPr/>
+          </p:nvGrpSpPr>
+          <p:grpSpPr>
+            <a:xfrm>
+              <a:off x="1981200" y="1531380"/>
+              <a:ext cx="4256313" cy="3962402"/>
+              <a:chOff x="2623457" y="2362200"/>
+              <a:chExt cx="4256313" cy="3962402"/>
+            </a:xfrm>
+            <a:effectLst>
+              <a:outerShdw blurRad="215900" dist="101600" dir="2700000" algn="tl" rotWithShape="0">
+                <a:prstClr val="black">
+                  <a:alpha val="56000"/>
+                </a:prstClr>
+              </a:outerShdw>
+            </a:effectLst>
+          </p:grpSpPr>
+          <p:sp>
+            <p:nvSpPr>
+              <p:cNvPr id="9" name="Isosceles Triangle 8"/>
+              <p:cNvSpPr/>
+              <p:nvPr/>
+            </p:nvSpPr>
+            <p:spPr>
+              <a:xfrm>
+                <a:off x="2623457" y="2362200"/>
+                <a:ext cx="1567543" cy="609600"/>
+              </a:xfrm>
+              <a:prstGeom prst="triangle">
+                <a:avLst/>
+              </a:prstGeom>
+              <a:solidFill>
+                <a:schemeClr val="tx1">
+                  <a:lumMod val="85000"/>
+                  <a:lumOff val="15000"/>
+                </a:schemeClr>
+              </a:solidFill>
+              <a:ln>
+                <a:solidFill>
+                  <a:schemeClr val="tx1">
+                    <a:lumMod val="85000"/>
+                    <a:lumOff val="15000"/>
+                  </a:schemeClr>
+                </a:solidFill>
+              </a:ln>
+            </p:spPr>
+            <p:style>
+              <a:lnRef idx="2">
+                <a:schemeClr val="accent1">
+                  <a:shade val="50000"/>
+                </a:schemeClr>
+              </a:lnRef>
+              <a:fillRef idx="1">
+                <a:schemeClr val="accent1"/>
+              </a:fillRef>
+              <a:effectRef idx="0">
+                <a:schemeClr val="accent1"/>
+              </a:effectRef>
+              <a:fontRef idx="minor">
+                <a:schemeClr val="lt1"/>
+              </a:fontRef>
+            </p:style>
+            <p:txBody>
+              <a:bodyPr rtlCol="0" anchor="ctr"/>
+              <a:lstStyle/>
+              <a:p>
+                <a:pPr algn="ctr"/>
+                <a:endParaRPr lang="en-US"/>
+              </a:p>
+            </p:txBody>
+          </p:sp>
+          <p:sp>
+            <p:nvSpPr>
+              <p:cNvPr id="10" name="Rectangle 9"/>
+              <p:cNvSpPr/>
+              <p:nvPr/>
+            </p:nvSpPr>
+            <p:spPr>
+              <a:xfrm>
+                <a:off x="3428999" y="2362200"/>
+                <a:ext cx="3408219" cy="609600"/>
+              </a:xfrm>
+              <a:prstGeom prst="rect">
+                <a:avLst/>
+              </a:prstGeom>
+              <a:solidFill>
+                <a:schemeClr val="tx1">
+                  <a:lumMod val="85000"/>
+                  <a:lumOff val="15000"/>
+                </a:schemeClr>
+              </a:solidFill>
+              <a:ln>
+                <a:solidFill>
+                  <a:schemeClr val="tx1">
+                    <a:lumMod val="85000"/>
+                    <a:lumOff val="15000"/>
+                  </a:schemeClr>
+                </a:solidFill>
+              </a:ln>
+            </p:spPr>
+            <p:style>
+              <a:lnRef idx="2">
+                <a:schemeClr val="accent1">
+                  <a:shade val="50000"/>
+                </a:schemeClr>
+              </a:lnRef>
+              <a:fillRef idx="1">
+                <a:schemeClr val="accent1"/>
+              </a:fillRef>
+              <a:effectRef idx="0">
+                <a:schemeClr val="accent1"/>
+              </a:effectRef>
+              <a:fontRef idx="minor">
+                <a:schemeClr val="lt1"/>
+              </a:fontRef>
+            </p:style>
+            <p:txBody>
+              <a:bodyPr rtlCol="0" anchor="ctr"/>
+              <a:lstStyle/>
+              <a:p>
+                <a:pPr algn="ctr"/>
+                <a:endParaRPr lang="en-US"/>
+              </a:p>
+            </p:txBody>
+          </p:sp>
+          <p:sp>
+            <p:nvSpPr>
+              <p:cNvPr id="11" name="Rectangle 10"/>
+              <p:cNvSpPr/>
+              <p:nvPr/>
+            </p:nvSpPr>
+            <p:spPr>
+              <a:xfrm rot="5400000">
+                <a:off x="5031919" y="3600453"/>
+                <a:ext cx="3086102" cy="609600"/>
+              </a:xfrm>
+              <a:prstGeom prst="rect">
+                <a:avLst/>
+              </a:prstGeom>
+              <a:solidFill>
+                <a:schemeClr val="tx1">
+                  <a:lumMod val="85000"/>
+                  <a:lumOff val="15000"/>
+                </a:schemeClr>
+              </a:solidFill>
+              <a:ln>
+                <a:solidFill>
+                  <a:schemeClr val="tx1">
+                    <a:lumMod val="85000"/>
+                    <a:lumOff val="15000"/>
+                  </a:schemeClr>
+                </a:solidFill>
+              </a:ln>
+            </p:spPr>
+            <p:style>
+              <a:lnRef idx="2">
+                <a:schemeClr val="accent1">
+                  <a:shade val="50000"/>
+                </a:schemeClr>
+              </a:lnRef>
+              <a:fillRef idx="1">
+                <a:schemeClr val="accent1"/>
+              </a:fillRef>
+              <a:effectRef idx="0">
+                <a:schemeClr val="accent1"/>
+              </a:effectRef>
+              <a:fontRef idx="minor">
+                <a:schemeClr val="lt1"/>
+              </a:fontRef>
+            </p:style>
+            <p:txBody>
+              <a:bodyPr rtlCol="0" anchor="ctr"/>
+              <a:lstStyle/>
+              <a:p>
+                <a:pPr algn="ctr"/>
+                <a:endParaRPr lang="en-US"/>
+              </a:p>
+            </p:txBody>
+          </p:sp>
+          <p:sp>
+            <p:nvSpPr>
+              <p:cNvPr id="12" name="Isosceles Triangle 11"/>
+              <p:cNvSpPr/>
+              <p:nvPr/>
+            </p:nvSpPr>
+            <p:spPr>
+              <a:xfrm rot="5400000">
+                <a:off x="5698670" y="5143503"/>
+                <a:ext cx="1752600" cy="609598"/>
+              </a:xfrm>
+              <a:prstGeom prst="triangle">
+                <a:avLst/>
+              </a:prstGeom>
+              <a:solidFill>
+                <a:schemeClr val="tx1">
+                  <a:lumMod val="85000"/>
+                  <a:lumOff val="15000"/>
+                </a:schemeClr>
+              </a:solidFill>
+              <a:ln>
+                <a:solidFill>
+                  <a:schemeClr val="tx1">
+                    <a:lumMod val="85000"/>
+                    <a:lumOff val="15000"/>
+                  </a:schemeClr>
+                </a:solidFill>
+              </a:ln>
+            </p:spPr>
+            <p:style>
+              <a:lnRef idx="2">
+                <a:schemeClr val="accent1">
+                  <a:shade val="50000"/>
+                </a:schemeClr>
+              </a:lnRef>
+              <a:fillRef idx="1">
+                <a:schemeClr val="accent1"/>
+              </a:fillRef>
+              <a:effectRef idx="0">
+                <a:schemeClr val="accent1"/>
+              </a:effectRef>
+              <a:fontRef idx="minor">
+                <a:schemeClr val="lt1"/>
+              </a:fontRef>
+            </p:style>
+            <p:txBody>
+              <a:bodyPr rtlCol="0" anchor="ctr"/>
+              <a:lstStyle/>
+              <a:p>
+                <a:pPr algn="ctr"/>
+                <a:endParaRPr lang="en-US"/>
+              </a:p>
+            </p:txBody>
+          </p:sp>
+          <p:cxnSp>
+            <p:nvCxnSpPr>
+              <p:cNvPr id="13" name="Straight Connector 12"/>
+              <p:cNvCxnSpPr/>
+              <p:nvPr/>
+            </p:nvCxnSpPr>
+            <p:spPr>
+              <a:xfrm flipV="1">
+                <a:off x="6270170" y="2362200"/>
+                <a:ext cx="609600" cy="609600"/>
+              </a:xfrm>
+              <a:prstGeom prst="line">
+                <a:avLst/>
+              </a:prstGeom>
+              <a:ln w="19050">
+                <a:solidFill>
+                  <a:schemeClr val="tx1">
+                    <a:lumMod val="95000"/>
+                    <a:lumOff val="5000"/>
+                  </a:schemeClr>
+                </a:solidFill>
+              </a:ln>
+            </p:spPr>
+            <p:style>
+              <a:lnRef idx="1">
+                <a:schemeClr val="accent1"/>
+              </a:lnRef>
+              <a:fillRef idx="0">
+                <a:schemeClr val="accent1"/>
+              </a:fillRef>
+              <a:effectRef idx="0">
+                <a:schemeClr val="accent1"/>
+              </a:effectRef>
+              <a:fontRef idx="minor">
+                <a:schemeClr val="tx1"/>
+              </a:fontRef>
+            </p:style>
+          </p:cxnSp>
+          <p:sp>
+            <p:nvSpPr>
+              <p:cNvPr id="14" name="Rectangle 13"/>
+              <p:cNvSpPr/>
+              <p:nvPr/>
+            </p:nvSpPr>
+            <p:spPr>
+              <a:xfrm>
+                <a:off x="2623457" y="2971800"/>
+                <a:ext cx="3657600" cy="3352800"/>
+              </a:xfrm>
+              <a:prstGeom prst="rect">
+                <a:avLst/>
+              </a:prstGeom>
+              <a:noFill/>
+              <a:ln w="38100"/>
+            </p:spPr>
+            <p:style>
+              <a:lnRef idx="2">
+                <a:schemeClr val="dk1">
+                  <a:shade val="50000"/>
+                </a:schemeClr>
+              </a:lnRef>
+              <a:fillRef idx="1">
+                <a:schemeClr val="dk1"/>
+              </a:fillRef>
+              <a:effectRef idx="0">
+                <a:schemeClr val="dk1"/>
+              </a:effectRef>
+              <a:fontRef idx="minor">
+                <a:schemeClr val="lt1"/>
+              </a:fontRef>
+            </p:style>
+            <p:txBody>
+              <a:bodyPr rtlCol="0" anchor="ctr"/>
+              <a:lstStyle/>
+              <a:p>
+                <a:pPr algn="ctr"/>
+                <a:endParaRPr lang="en-US"/>
+              </a:p>
+            </p:txBody>
+          </p:sp>
+        </p:grpSp>
+      </p:grpSp>
+    </p:spTree>
+    <p:extLst>
+      <p:ext uri="{BB962C8B-B14F-4D97-AF65-F5344CB8AC3E}">
+        <p14:creationId xmlns:p14="http://schemas.microsoft.com/office/powerpoint/2010/main" val="2226850277"/>
+      </p:ext>
+    </p:extLst>
+  </p:cSld>
+  <p:clrMapOvr>
+    <a:masterClrMapping/>
+  </p:clrMapOvr>
+  <p:timing>
+    <p:tnLst>
+      <p:par>
+        <p:cTn id="1" dur="indefinite" restart="never" nodeType="tmRoot"/>
+      </p:par>
+    </p:tnLst>
+  </p:timing>
+</p:sld>
+</file>
+
+<file path=ppt/slides/slide5.xml><?xml version="1.0" encoding="utf-8"?>
+<p:sld xmlns:a="http://schemas.openxmlformats.org/drawingml/2006/main" xmlns:r="http://schemas.openxmlformats.org/officeDocument/2006/relationships" xmlns:p="http://schemas.openxmlformats.org/presentationml/2006/main">
+  <p:cSld>
+    <p:spTree>
+      <p:nvGrpSpPr>
+        <p:cNvPr id="1" name=""/>
+        <p:cNvGrpSpPr/>
+        <p:nvPr/>
+      </p:nvGrpSpPr>
+      <p:grpSpPr>
+        <a:xfrm>
+          <a:off x="0" y="0"/>
+          <a:ext cx="0" cy="0"/>
+          <a:chOff x="0" y="0"/>
+          <a:chExt cx="0" cy="0"/>
+        </a:xfrm>
+      </p:grpSpPr>
+      <p:sp>
+        <p:nvSpPr>
+          <p:cNvPr id="2" name="Title 1"/>
+          <p:cNvSpPr>
+            <a:spLocks noGrp="1"/>
+          </p:cNvSpPr>
+          <p:nvPr>
+            <p:ph type="title"/>
+          </p:nvPr>
+        </p:nvSpPr>
+        <p:spPr/>
+        <p:txBody>
           <a:bodyPr/>
           <a:lstStyle/>
           <a:p>
@@ -9213,7 +9898,6 @@
               <a:rPr lang="en-US" sz="2400" dirty="0"/>
               <a:t> tools can be thought of as functions</a:t>
             </a:r>
-            <a:endParaRPr lang="en-US" sz="2400" dirty="0"/>
           </a:p>
         </p:txBody>
       </p:sp>
@@ -9244,7 +9928,6 @@
               <a:rPr lang="en-US" dirty="0"/>
               <a:t>Text (strings)</a:t>
             </a:r>
-            <a:endParaRPr lang="en-US" dirty="0"/>
           </a:p>
         </p:txBody>
       </p:sp>
@@ -9275,7 +9958,6 @@
               <a:rPr lang="en-US" dirty="0"/>
               <a:t>Numbers</a:t>
             </a:r>
-            <a:endParaRPr lang="en-US" dirty="0"/>
           </a:p>
         </p:txBody>
       </p:sp>
@@ -9306,7 +9988,6 @@
               <a:rPr lang="en-US" dirty="0"/>
               <a:t>Fields from Tables</a:t>
             </a:r>
-            <a:endParaRPr lang="en-US" dirty="0"/>
           </a:p>
         </p:txBody>
       </p:sp>
@@ -9340,17 +10021,7 @@
                   </a:schemeClr>
                 </a:solidFill>
               </a:rPr>
-              <a:t>d</a:t>
-            </a:r>
-            <a:r>
-              <a:rPr lang="en-US" sz="1500" dirty="0" err="1">
-                <a:solidFill>
-                  <a:schemeClr val="accent2">
-                    <a:lumMod val="50000"/>
-                  </a:schemeClr>
-                </a:solidFill>
-              </a:rPr>
-              <a:t>ef</a:t>
+              <a:t>def</a:t>
             </a:r>
             <a:r>
               <a:rPr lang="en-US" sz="1500" dirty="0"/>
@@ -9426,11 +10097,7 @@
           <a:p>
             <a:r>
               <a:rPr lang="en-US" sz="1500" dirty="0"/>
-              <a:t> </a:t>
-            </a:r>
-            <a:r>
-              <a:rPr lang="en-US" sz="1500" dirty="0"/>
-              <a:t>   </a:t>
+              <a:t>    </a:t>
             </a:r>
             <a:r>
               <a:rPr lang="en-US" sz="1500" dirty="0">
@@ -9450,11 +10117,7 @@
           <a:p>
             <a:r>
               <a:rPr lang="en-US" sz="1500" dirty="0"/>
-              <a:t> </a:t>
-            </a:r>
-            <a:r>
-              <a:rPr lang="en-US" sz="1500" dirty="0"/>
-              <a:t>       </a:t>
+              <a:t>        </a:t>
             </a:r>
             <a:r>
               <a:rPr lang="en-US" sz="1500" dirty="0">
@@ -9470,7 +10133,6 @@
               <a:rPr lang="en-US" sz="1500" dirty="0"/>
               <a:t> False</a:t>
             </a:r>
-            <a:endParaRPr lang="en-US" sz="1500" dirty="0"/>
           </a:p>
         </p:txBody>
       </p:sp>
@@ -9501,7 +10163,6 @@
               <a:rPr lang="en-US" sz="2400" dirty="0"/>
               <a:t>We can also make our own functions for field calculations</a:t>
             </a:r>
-            <a:endParaRPr lang="en-US" sz="2400" dirty="0"/>
           </a:p>
         </p:txBody>
       </p:sp>
@@ -9941,7 +10602,198 @@
 </p:sld>
 </file>
 
-<file path=ppt/slides/slide4.xml><?xml version="1.0" encoding="utf-8"?>
+<file path=ppt/slides/slide6.xml><?xml version="1.0" encoding="utf-8"?>
+<p:sld xmlns:a="http://schemas.openxmlformats.org/drawingml/2006/main" xmlns:r="http://schemas.openxmlformats.org/officeDocument/2006/relationships" xmlns:p="http://schemas.openxmlformats.org/presentationml/2006/main">
+  <p:cSld>
+    <p:spTree>
+      <p:nvGrpSpPr>
+        <p:cNvPr id="1" name=""/>
+        <p:cNvGrpSpPr/>
+        <p:nvPr/>
+      </p:nvGrpSpPr>
+      <p:grpSpPr>
+        <a:xfrm>
+          <a:off x="0" y="0"/>
+          <a:ext cx="0" cy="0"/>
+          <a:chOff x="0" y="0"/>
+          <a:chExt cx="0" cy="0"/>
+        </a:xfrm>
+      </p:grpSpPr>
+      <p:sp>
+        <p:nvSpPr>
+          <p:cNvPr id="2" name="Title 1"/>
+          <p:cNvSpPr>
+            <a:spLocks noGrp="1"/>
+          </p:cNvSpPr>
+          <p:nvPr>
+            <p:ph type="title"/>
+          </p:nvPr>
+        </p:nvSpPr>
+        <p:spPr/>
+        <p:txBody>
+          <a:bodyPr/>
+          <a:lstStyle/>
+          <a:p>
+            <a:r>
+              <a:rPr lang="en-US" dirty="0" smtClean="0"/>
+              <a:t>Basic Python Terminology</a:t>
+            </a:r>
+            <a:endParaRPr lang="en-US" dirty="0"/>
+          </a:p>
+        </p:txBody>
+      </p:sp>
+      <p:sp>
+        <p:nvSpPr>
+          <p:cNvPr id="3" name="Content Placeholder 2"/>
+          <p:cNvSpPr>
+            <a:spLocks noGrp="1"/>
+          </p:cNvSpPr>
+          <p:nvPr>
+            <p:ph idx="1"/>
+          </p:nvPr>
+        </p:nvSpPr>
+        <p:spPr>
+          <a:xfrm>
+            <a:off x="762000" y="1219200"/>
+            <a:ext cx="7924800" cy="5486400"/>
+          </a:xfrm>
+          <a:ln>
+            <a:noFill/>
+          </a:ln>
+        </p:spPr>
+        <p:txBody>
+          <a:bodyPr>
+            <a:normAutofit fontScale="92500" lnSpcReduction="20000"/>
+          </a:bodyPr>
+          <a:lstStyle/>
+          <a:p>
+            <a:r>
+              <a:rPr lang="en-US" dirty="0" smtClean="0">
+                <a:solidFill>
+                  <a:schemeClr val="accent2">
+                    <a:lumMod val="50000"/>
+                  </a:schemeClr>
+                </a:solidFill>
+              </a:rPr>
+              <a:t>Statement</a:t>
+            </a:r>
+          </a:p>
+          <a:p>
+            <a:pPr lvl="1"/>
+            <a:r>
+              <a:rPr lang="en-US" dirty="0" smtClean="0"/>
+              <a:t>A line of code that does some work</a:t>
+            </a:r>
+          </a:p>
+          <a:p>
+            <a:r>
+              <a:rPr lang="en-US" dirty="0" smtClean="0">
+                <a:solidFill>
+                  <a:schemeClr val="accent2">
+                    <a:lumMod val="50000"/>
+                  </a:schemeClr>
+                </a:solidFill>
+              </a:rPr>
+              <a:t>Variable</a:t>
+            </a:r>
+          </a:p>
+          <a:p>
+            <a:pPr lvl="1"/>
+            <a:r>
+              <a:rPr lang="en-US" dirty="0" smtClean="0"/>
+              <a:t>Just like in algebra, these are names for values that can change</a:t>
+            </a:r>
+          </a:p>
+          <a:p>
+            <a:r>
+              <a:rPr lang="en-US" dirty="0" smtClean="0">
+                <a:solidFill>
+                  <a:schemeClr val="accent2">
+                    <a:lumMod val="50000"/>
+                  </a:schemeClr>
+                </a:solidFill>
+              </a:rPr>
+              <a:t>String</a:t>
+            </a:r>
+          </a:p>
+          <a:p>
+            <a:pPr lvl="1"/>
+            <a:r>
+              <a:rPr lang="en-US" dirty="0" smtClean="0"/>
+              <a:t>Think of it as text – letters strung along one after another</a:t>
+            </a:r>
+          </a:p>
+          <a:p>
+            <a:r>
+              <a:rPr lang="en-US" dirty="0" smtClean="0">
+                <a:solidFill>
+                  <a:schemeClr val="accent2">
+                    <a:lumMod val="50000"/>
+                  </a:schemeClr>
+                </a:solidFill>
+              </a:rPr>
+              <a:t>Function</a:t>
+            </a:r>
+          </a:p>
+          <a:p>
+            <a:pPr lvl="1"/>
+            <a:r>
+              <a:rPr lang="en-US" dirty="0" smtClean="0"/>
+              <a:t>A named block of code that can be reused</a:t>
+            </a:r>
+          </a:p>
+          <a:p>
+            <a:r>
+              <a:rPr lang="en-US" dirty="0" smtClean="0">
+                <a:solidFill>
+                  <a:schemeClr val="accent2">
+                    <a:lumMod val="50000"/>
+                  </a:schemeClr>
+                </a:solidFill>
+              </a:rPr>
+              <a:t>Block</a:t>
+            </a:r>
+          </a:p>
+          <a:p>
+            <a:pPr lvl="1"/>
+            <a:r>
+              <a:rPr lang="en-US" dirty="0" smtClean="0"/>
+              <a:t>A set of code that executes together</a:t>
+            </a:r>
+          </a:p>
+          <a:p>
+            <a:pPr lvl="1"/>
+            <a:r>
+              <a:rPr lang="en-US" dirty="0" smtClean="0"/>
+              <a:t>This will make sense when we start looking at code</a:t>
+            </a:r>
+          </a:p>
+          <a:p>
+            <a:endParaRPr lang="en-US" dirty="0"/>
+          </a:p>
+        </p:txBody>
+      </p:sp>
+    </p:spTree>
+    <p:extLst>
+      <p:ext uri="{BB962C8B-B14F-4D97-AF65-F5344CB8AC3E}">
+        <p14:creationId xmlns:p14="http://schemas.microsoft.com/office/powerpoint/2010/main" val="3780303758"/>
+      </p:ext>
+    </p:extLst>
+  </p:cSld>
+  <p:clrMapOvr>
+    <a:masterClrMapping/>
+  </p:clrMapOvr>
+  <p:timing>
+    <p:tnLst>
+      <p:par>
+        <p:cTn id="1" dur="indefinite" restart="never" nodeType="tmRoot"/>
+      </p:par>
+    </p:tnLst>
+  </p:timing>
+</p:sld>
+</file>
+
+<file path=ppt/slides/slide7.xml><?xml version="1.0" encoding="utf-8"?>
 <p:sld xmlns:a="http://schemas.openxmlformats.org/drawingml/2006/main" xmlns:r="http://schemas.openxmlformats.org/officeDocument/2006/relationships" xmlns:p="http://schemas.openxmlformats.org/presentationml/2006/main">
   <p:cSld>
     <p:spTree>
@@ -10545,7 +11397,11 @@
                   </a:schemeClr>
                 </a:solidFill>
               </a:rPr>
-              <a:t>	</a:t>
+              <a:t>	“student3”</a:t>
+            </a:r>
+            <a:r>
+              <a:rPr lang="en-US" sz="2100" dirty="0"/>
+              <a:t>, </a:t>
             </a:r>
             <a:r>
               <a:rPr lang="en-US" sz="2100" dirty="0">
@@ -10555,13 +11411,9 @@
                   </a:schemeClr>
                 </a:solidFill>
               </a:rPr>
-              <a:t>“student3”</a:t>
-            </a:r>
-            <a:r>
-              <a:rPr lang="en-US" sz="2100" dirty="0"/>
-              <a:t>, </a:t>
-            </a:r>
-            <a:r>
+              <a:t>“student4”</a:t>
+            </a:r>
+            <a:br>
               <a:rPr lang="en-US" sz="2100" dirty="0">
                 <a:solidFill>
                   <a:schemeClr val="accent1">
@@ -10569,9 +11421,57 @@
                   </a:schemeClr>
                 </a:solidFill>
               </a:rPr>
-              <a:t>“student4”</a:t>
+            </a:br>
+            <a:r>
+              <a:rPr lang="en-US" sz="2100" dirty="0"/>
+              <a:t>]</a:t>
+            </a:r>
+          </a:p>
+          <a:p>
+            <a:pPr marL="0" indent="0">
+              <a:buNone/>
+            </a:pPr>
+            <a:r>
+              <a:rPr lang="en-US" sz="2100" dirty="0">
+                <a:solidFill>
+                  <a:schemeClr val="accent4">
+                    <a:lumMod val="75000"/>
+                  </a:schemeClr>
+                </a:solidFill>
+              </a:rPr>
+              <a:t/>
             </a:r>
             <a:br>
+              <a:rPr lang="en-US" sz="2100" dirty="0">
+                <a:solidFill>
+                  <a:schemeClr val="accent4">
+                    <a:lumMod val="75000"/>
+                  </a:schemeClr>
+                </a:solidFill>
+              </a:rPr>
+            </a:br>
+            <a:r>
+              <a:rPr lang="en-US" sz="2100" dirty="0" err="1">
+                <a:solidFill>
+                  <a:schemeClr val="accent4">
+                    <a:lumMod val="75000"/>
+                  </a:schemeClr>
+                </a:solidFill>
+              </a:rPr>
+              <a:t>student_names</a:t>
+            </a:r>
+            <a:r>
+              <a:rPr lang="en-US" sz="2100" dirty="0"/>
+              <a:t> = { </a:t>
+            </a:r>
+            <a:br>
+              <a:rPr lang="en-US" sz="2100" dirty="0"/>
+            </a:br>
+            <a:r>
+              <a:rPr lang="en-US" sz="2100" dirty="0"/>
+              <a:t>    </a:t>
+            </a:r>
+            <a:r>
               <a:rPr lang="en-US" sz="2100" dirty="0">
                 <a:solidFill>
                   <a:schemeClr val="accent1">
@@ -10579,48 +11479,25 @@
                   </a:schemeClr>
                 </a:solidFill>
               </a:rPr>
-            </a:br>
+              <a:t>“student1”</a:t>
+            </a:r>
             <a:r>
               <a:rPr lang="en-US" sz="2100" dirty="0"/>
-              <a:t>]</a:t>
-            </a:r>
-          </a:p>
-          <a:p>
-            <a:pPr marL="0" indent="0">
-              <a:buNone/>
-            </a:pPr>
+              <a:t>: </a:t>
+            </a:r>
             <a:r>
               <a:rPr lang="en-US" sz="2100" dirty="0">
                 <a:solidFill>
-                  <a:schemeClr val="accent4">
+                  <a:schemeClr val="accent1">
                     <a:lumMod val="75000"/>
                   </a:schemeClr>
                 </a:solidFill>
               </a:rPr>
-              <a:t/>
-            </a:r>
-            <a:br>
-              <a:rPr lang="en-US" sz="2100" dirty="0">
-                <a:solidFill>
-                  <a:schemeClr val="accent4">
-                    <a:lumMod val="75000"/>
-                  </a:schemeClr>
-                </a:solidFill>
-              </a:rPr>
-            </a:br>
-            <a:r>
-              <a:rPr lang="en-US" sz="2100" dirty="0" err="1">
-                <a:solidFill>
-                  <a:schemeClr val="accent4">
-                    <a:lumMod val="75000"/>
-                  </a:schemeClr>
-                </a:solidFill>
-              </a:rPr>
-              <a:t>student_names</a:t>
+              <a:t>“Jennifer”</a:t>
             </a:r>
             <a:r>
               <a:rPr lang="en-US" sz="2100" dirty="0"/>
-              <a:t> = { </a:t>
+              <a:t>,</a:t>
             </a:r>
             <a:br>
               <a:rPr lang="en-US" sz="2100" dirty="0"/>
@@ -10637,7 +11514,7 @@
                   </a:schemeClr>
                 </a:solidFill>
               </a:rPr>
-              <a:t>“student1”</a:t>
+              <a:t>“student2”</a:t>
             </a:r>
             <a:r>
               <a:rPr lang="en-US" sz="2100" dirty="0"/>
@@ -10651,55 +11528,19 @@
                   </a:schemeClr>
                 </a:solidFill>
               </a:rPr>
-              <a:t>“Jennifer”</a:t>
+              <a:t>“Dan”</a:t>
             </a:r>
             <a:r>
               <a:rPr lang="en-US" sz="2100" dirty="0"/>
-              <a:t>,</a:t>
+              <a:t/>
             </a:r>
             <a:br>
               <a:rPr lang="en-US" sz="2100" dirty="0"/>
             </a:br>
             <a:r>
               <a:rPr lang="en-US" sz="2100" dirty="0"/>
-              <a:t>    </a:t>
-            </a:r>
-            <a:r>
-              <a:rPr lang="en-US" sz="2100" dirty="0">
-                <a:solidFill>
-                  <a:schemeClr val="accent1">
-                    <a:lumMod val="75000"/>
-                  </a:schemeClr>
-                </a:solidFill>
-              </a:rPr>
-              <a:t>“student2”</a:t>
-            </a:r>
-            <a:r>
-              <a:rPr lang="en-US" sz="2100" dirty="0"/>
-              <a:t>: </a:t>
-            </a:r>
-            <a:r>
-              <a:rPr lang="en-US" sz="2100" dirty="0">
-                <a:solidFill>
-                  <a:schemeClr val="accent1">
-                    <a:lumMod val="75000"/>
-                  </a:schemeClr>
-                </a:solidFill>
-              </a:rPr>
-              <a:t>“Dan”</a:t>
-            </a:r>
-            <a:r>
-              <a:rPr lang="en-US" sz="2100" dirty="0"/>
-              <a:t/>
-            </a:r>
-            <a:br>
-              <a:rPr lang="en-US" sz="2100" dirty="0"/>
-            </a:br>
-            <a:r>
-              <a:rPr lang="en-US" sz="2100" dirty="0"/>
               <a:t>}</a:t>
             </a:r>
-            <a:endParaRPr lang="en-US" sz="2100" dirty="0"/>
           </a:p>
           <a:p>
             <a:pPr marL="0" indent="0">
@@ -10740,7 +11581,6 @@
               <a:rPr lang="en-US" sz="1350" i="1" dirty="0"/>
               <a:t>List</a:t>
             </a:r>
-            <a:endParaRPr lang="en-US" sz="1350" i="1" dirty="0"/>
           </a:p>
         </p:txBody>
       </p:sp>
@@ -10859,7 +11699,17 @@
                   </a:schemeClr>
                 </a:solidFill>
               </a:rPr>
-              <a:t>“of</a:t>
+              <a:t>“of”</a:t>
+            </a:r>
+            <a:r>
+              <a:rPr lang="en-US" sz="2100" dirty="0"/>
+              <a:t>,</a:t>
+            </a:r>
+          </a:p>
+          <a:p>
+            <a:r>
+              <a:rPr lang="en-US" sz="2100" dirty="0"/>
+              <a:t>                             </a:t>
             </a:r>
             <a:r>
               <a:rPr lang="en-US" sz="2100" dirty="0">
@@ -10869,30 +11719,6 @@
                   </a:schemeClr>
                 </a:solidFill>
               </a:rPr>
-              <a:t>”</a:t>
-            </a:r>
-            <a:r>
-              <a:rPr lang="en-US" sz="2100" dirty="0"/>
-              <a:t>,</a:t>
-            </a:r>
-          </a:p>
-          <a:p>
-            <a:r>
-              <a:rPr lang="en-US" sz="2100" dirty="0"/>
-              <a:t> </a:t>
-            </a:r>
-            <a:r>
-              <a:rPr lang="en-US" sz="2100" dirty="0"/>
-              <a:t>                            </a:t>
-            </a:r>
-            <a:r>
-              <a:rPr lang="en-US" sz="2100" dirty="0">
-                <a:solidFill>
-                  <a:schemeClr val="accent1">
-                    <a:lumMod val="75000"/>
-                  </a:schemeClr>
-                </a:solidFill>
-              </a:rPr>
               <a:t>“values”</a:t>
             </a:r>
             <a:r>
@@ -10913,45 +11739,21 @@
             </a:r>
             <a:r>
               <a:rPr lang="en-US" sz="2100" dirty="0"/>
-              <a:t> </a:t>
-            </a:r>
-            <a:r>
-              <a:rPr lang="en-US" sz="2100" dirty="0"/>
-              <a:t>= </a:t>
-            </a:r>
-            <a:r>
-              <a:rPr lang="en-US" sz="2100" dirty="0"/>
-              <a:t>{</a:t>
+              <a:t> = {</a:t>
             </a:r>
             <a:br>
               <a:rPr lang="en-US" sz="2100" dirty="0"/>
             </a:br>
             <a:r>
               <a:rPr lang="en-US" sz="2100" dirty="0"/>
-              <a:t>    key</a:t>
-            </a:r>
-            <a:r>
-              <a:rPr lang="en-US" sz="2100" dirty="0"/>
-              <a:t>: value</a:t>
-            </a:r>
-            <a:r>
-              <a:rPr lang="en-US" sz="2100" dirty="0"/>
-              <a:t>,</a:t>
+              <a:t>    key: value,</a:t>
             </a:r>
             <a:br>
               <a:rPr lang="en-US" sz="2100" dirty="0"/>
             </a:br>
             <a:r>
               <a:rPr lang="en-US" sz="2100" dirty="0"/>
-              <a:t>    key2</a:t>
-            </a:r>
-            <a:r>
-              <a:rPr lang="en-US" sz="2100" dirty="0"/>
-              <a:t>: </a:t>
-            </a:r>
-            <a:r>
-              <a:rPr lang="en-US" sz="2100" dirty="0"/>
-              <a:t>value2,</a:t>
+              <a:t>    key2: value2,</a:t>
             </a:r>
             <a:br>
               <a:rPr lang="en-US" sz="2100" dirty="0"/>
@@ -11935,896 +12737,6 @@
 </p:sld>
 </file>
 
-<file path=ppt/slides/slide5.xml><?xml version="1.0" encoding="utf-8"?>
-<p:sld xmlns:a="http://schemas.openxmlformats.org/drawingml/2006/main" xmlns:r="http://schemas.openxmlformats.org/officeDocument/2006/relationships" xmlns:p="http://schemas.openxmlformats.org/presentationml/2006/main">
-  <p:cSld>
-    <p:spTree>
-      <p:nvGrpSpPr>
-        <p:cNvPr id="1" name=""/>
-        <p:cNvGrpSpPr/>
-        <p:nvPr/>
-      </p:nvGrpSpPr>
-      <p:grpSpPr>
-        <a:xfrm>
-          <a:off x="0" y="0"/>
-          <a:ext cx="0" cy="0"/>
-          <a:chOff x="0" y="0"/>
-          <a:chExt cx="0" cy="0"/>
-        </a:xfrm>
-      </p:grpSpPr>
-      <p:sp>
-        <p:nvSpPr>
-          <p:cNvPr id="2" name="Title 1"/>
-          <p:cNvSpPr>
-            <a:spLocks noGrp="1"/>
-          </p:cNvSpPr>
-          <p:nvPr>
-            <p:ph type="title"/>
-          </p:nvPr>
-        </p:nvSpPr>
-        <p:spPr/>
-        <p:txBody>
-          <a:bodyPr/>
-          <a:lstStyle/>
-          <a:p>
-            <a:r>
-              <a:rPr lang="en-US" dirty="0" smtClean="0"/>
-              <a:t>Conditionals</a:t>
-            </a:r>
-            <a:endParaRPr lang="en-US" dirty="0"/>
-          </a:p>
-        </p:txBody>
-      </p:sp>
-      <p:sp>
-        <p:nvSpPr>
-          <p:cNvPr id="3" name="Content Placeholder 2"/>
-          <p:cNvSpPr>
-            <a:spLocks noGrp="1"/>
-          </p:cNvSpPr>
-          <p:nvPr>
-            <p:ph idx="1"/>
-          </p:nvPr>
-        </p:nvSpPr>
-        <p:spPr>
-          <a:xfrm>
-            <a:off x="628650" y="2226469"/>
-            <a:ext cx="3667125" cy="3263504"/>
-          </a:xfrm>
-        </p:spPr>
-        <p:txBody>
-          <a:bodyPr>
-            <a:normAutofit fontScale="85000" lnSpcReduction="10000"/>
-          </a:bodyPr>
-          <a:lstStyle/>
-          <a:p>
-            <a:pPr marL="0" indent="0">
-              <a:buNone/>
-            </a:pPr>
-            <a:r>
-              <a:rPr lang="en-US" sz="2400" b="1" dirty="0"/>
-              <a:t>General Form</a:t>
-            </a:r>
-            <a:endParaRPr lang="en-US" sz="1800" dirty="0"/>
-          </a:p>
-          <a:p>
-            <a:pPr marL="0" indent="0">
-              <a:buNone/>
-            </a:pPr>
-            <a:r>
-              <a:rPr lang="en-US" dirty="0" smtClean="0">
-                <a:solidFill>
-                  <a:schemeClr val="accent6">
-                    <a:lumMod val="50000"/>
-                  </a:schemeClr>
-                </a:solidFill>
-              </a:rPr>
-              <a:t>if</a:t>
-            </a:r>
-            <a:r>
-              <a:rPr lang="en-US" dirty="0" smtClean="0"/>
-              <a:t> {condition evaluates to true}:</a:t>
-            </a:r>
-          </a:p>
-          <a:p>
-            <a:pPr marL="0" indent="0">
-              <a:buNone/>
-            </a:pPr>
-            <a:r>
-              <a:rPr lang="en-US" dirty="0"/>
-              <a:t> </a:t>
-            </a:r>
-            <a:r>
-              <a:rPr lang="en-US" dirty="0" smtClean="0"/>
-              <a:t>    {run some code}</a:t>
-            </a:r>
-          </a:p>
-          <a:p>
-            <a:pPr marL="0" indent="0">
-              <a:buNone/>
-            </a:pPr>
-            <a:r>
-              <a:rPr lang="en-US" dirty="0" smtClean="0">
-                <a:solidFill>
-                  <a:schemeClr val="accent6">
-                    <a:lumMod val="50000"/>
-                  </a:schemeClr>
-                </a:solidFill>
-              </a:rPr>
-              <a:t>else</a:t>
-            </a:r>
-            <a:r>
-              <a:rPr lang="en-US" dirty="0" smtClean="0"/>
-              <a:t>: # condition is false</a:t>
-            </a:r>
-          </a:p>
-          <a:p>
-            <a:pPr marL="0" indent="0">
-              <a:buNone/>
-            </a:pPr>
-            <a:r>
-              <a:rPr lang="en-US" dirty="0"/>
-              <a:t> </a:t>
-            </a:r>
-            <a:r>
-              <a:rPr lang="en-US" dirty="0" smtClean="0"/>
-              <a:t>   {run different code}</a:t>
-            </a:r>
-          </a:p>
-        </p:txBody>
-      </p:sp>
-      <p:sp>
-        <p:nvSpPr>
-          <p:cNvPr id="4" name="Rectangle 3"/>
-          <p:cNvSpPr/>
-          <p:nvPr/>
-        </p:nvSpPr>
-        <p:spPr>
-          <a:xfrm>
-            <a:off x="5181600" y="2226469"/>
-            <a:ext cx="2524125" cy="1754326"/>
-          </a:xfrm>
-          <a:prstGeom prst="rect">
-            <a:avLst/>
-          </a:prstGeom>
-        </p:spPr>
-        <p:txBody>
-          <a:bodyPr wrap="square">
-            <a:spAutoFit/>
-          </a:bodyPr>
-          <a:lstStyle/>
-          <a:p>
-            <a:r>
-              <a:rPr lang="en-US" sz="2400" b="1" dirty="0"/>
-              <a:t>Example</a:t>
-            </a:r>
-            <a:endParaRPr lang="en-US" sz="2400" b="1" dirty="0"/>
-          </a:p>
-          <a:p>
-            <a:r>
-              <a:rPr lang="en-US" sz="2100" dirty="0">
-                <a:solidFill>
-                  <a:schemeClr val="accent6">
-                    <a:lumMod val="50000"/>
-                  </a:schemeClr>
-                </a:solidFill>
-              </a:rPr>
-              <a:t>if</a:t>
-            </a:r>
-            <a:r>
-              <a:rPr lang="en-US" sz="2100" dirty="0"/>
-              <a:t> value &gt; threshold:</a:t>
-            </a:r>
-          </a:p>
-          <a:p>
-            <a:r>
-              <a:rPr lang="en-US" sz="2100" dirty="0"/>
-              <a:t>   </a:t>
-            </a:r>
-            <a:r>
-              <a:rPr lang="en-US" sz="2100" dirty="0">
-                <a:solidFill>
-                  <a:schemeClr val="accent6">
-                    <a:lumMod val="50000"/>
-                  </a:schemeClr>
-                </a:solidFill>
-              </a:rPr>
-              <a:t>return</a:t>
-            </a:r>
-            <a:r>
-              <a:rPr lang="en-US" sz="2100" dirty="0"/>
-              <a:t> True</a:t>
-            </a:r>
-          </a:p>
-          <a:p>
-            <a:r>
-              <a:rPr lang="en-US" sz="2100" dirty="0">
-                <a:solidFill>
-                  <a:schemeClr val="accent6">
-                    <a:lumMod val="50000"/>
-                  </a:schemeClr>
-                </a:solidFill>
-              </a:rPr>
-              <a:t>else</a:t>
-            </a:r>
-            <a:r>
-              <a:rPr lang="en-US" sz="2100" dirty="0"/>
-              <a:t>:</a:t>
-            </a:r>
-          </a:p>
-          <a:p>
-            <a:r>
-              <a:rPr lang="en-US" sz="2100" dirty="0">
-                <a:solidFill>
-                  <a:schemeClr val="accent6">
-                    <a:lumMod val="50000"/>
-                  </a:schemeClr>
-                </a:solidFill>
-              </a:rPr>
-              <a:t>    return </a:t>
-            </a:r>
-            <a:r>
-              <a:rPr lang="en-US" sz="2100" dirty="0"/>
-              <a:t>False</a:t>
-            </a:r>
-          </a:p>
-        </p:txBody>
-      </p:sp>
-    </p:spTree>
-    <p:extLst>
-      <p:ext uri="{BB962C8B-B14F-4D97-AF65-F5344CB8AC3E}">
-        <p14:creationId xmlns:p14="http://schemas.microsoft.com/office/powerpoint/2010/main" val="2374134354"/>
-      </p:ext>
-    </p:extLst>
-  </p:cSld>
-  <p:clrMapOvr>
-    <a:masterClrMapping/>
-  </p:clrMapOvr>
-  <p:timing>
-    <p:tnLst>
-      <p:par>
-        <p:cTn id="1" dur="indefinite" restart="never" nodeType="tmRoot"/>
-      </p:par>
-    </p:tnLst>
-  </p:timing>
-</p:sld>
-</file>
-
-<file path=ppt/slides/slide6.xml><?xml version="1.0" encoding="utf-8"?>
-<p:sld xmlns:a="http://schemas.openxmlformats.org/drawingml/2006/main" xmlns:r="http://schemas.openxmlformats.org/officeDocument/2006/relationships" xmlns:p="http://schemas.openxmlformats.org/presentationml/2006/main">
-  <p:cSld>
-    <p:spTree>
-      <p:nvGrpSpPr>
-        <p:cNvPr id="1" name=""/>
-        <p:cNvGrpSpPr/>
-        <p:nvPr/>
-      </p:nvGrpSpPr>
-      <p:grpSpPr>
-        <a:xfrm>
-          <a:off x="0" y="0"/>
-          <a:ext cx="0" cy="0"/>
-          <a:chOff x="0" y="0"/>
-          <a:chExt cx="0" cy="0"/>
-        </a:xfrm>
-      </p:grpSpPr>
-      <p:sp>
-        <p:nvSpPr>
-          <p:cNvPr id="2" name="Title 1"/>
-          <p:cNvSpPr>
-            <a:spLocks noGrp="1"/>
-          </p:cNvSpPr>
-          <p:nvPr>
-            <p:ph type="ctrTitle"/>
-          </p:nvPr>
-        </p:nvSpPr>
-        <p:spPr/>
-        <p:txBody>
-          <a:bodyPr>
-            <a:normAutofit/>
-          </a:bodyPr>
-          <a:lstStyle/>
-          <a:p>
-            <a:r>
-              <a:rPr lang="en-US" dirty="0" smtClean="0"/>
-              <a:t>Beginning GIS Programming Using ArcGIS 10.0 and Python</a:t>
-            </a:r>
-            <a:endParaRPr lang="en-US" dirty="0"/>
-          </a:p>
-        </p:txBody>
-      </p:sp>
-      <p:sp>
-        <p:nvSpPr>
-          <p:cNvPr id="3" name="Subtitle 2"/>
-          <p:cNvSpPr>
-            <a:spLocks noGrp="1"/>
-          </p:cNvSpPr>
-          <p:nvPr>
-            <p:ph type="subTitle" idx="1"/>
-          </p:nvPr>
-        </p:nvSpPr>
-        <p:spPr>
-          <a:xfrm>
-            <a:off x="1371600" y="3886200"/>
-            <a:ext cx="6400800" cy="2590800"/>
-          </a:xfrm>
-        </p:spPr>
-        <p:txBody>
-          <a:bodyPr>
-            <a:normAutofit fontScale="70000" lnSpcReduction="20000"/>
-          </a:bodyPr>
-          <a:lstStyle/>
-          <a:p>
-            <a:r>
-              <a:rPr lang="en-US" dirty="0" smtClean="0">
-                <a:solidFill>
-                  <a:schemeClr val="tx1">
-                    <a:lumMod val="65000"/>
-                    <a:lumOff val="35000"/>
-                  </a:schemeClr>
-                </a:solidFill>
-              </a:rPr>
-              <a:t>Nick Santos, Josh </a:t>
-            </a:r>
-            <a:r>
-              <a:rPr lang="en-US" dirty="0" err="1" smtClean="0">
-                <a:solidFill>
-                  <a:schemeClr val="tx1">
-                    <a:lumMod val="65000"/>
-                    <a:lumOff val="35000"/>
-                  </a:schemeClr>
-                </a:solidFill>
-              </a:rPr>
-              <a:t>Viers</a:t>
-            </a:r>
-            <a:r>
-              <a:rPr lang="en-US" dirty="0" smtClean="0">
-                <a:solidFill>
-                  <a:schemeClr val="tx1">
-                    <a:lumMod val="65000"/>
-                    <a:lumOff val="35000"/>
-                  </a:schemeClr>
-                </a:solidFill>
-              </a:rPr>
-              <a:t>, and Anna </a:t>
-            </a:r>
-            <a:r>
-              <a:rPr lang="en-US" dirty="0" err="1" smtClean="0">
-                <a:solidFill>
-                  <a:schemeClr val="tx1">
-                    <a:lumMod val="65000"/>
-                    <a:lumOff val="35000"/>
-                  </a:schemeClr>
-                </a:solidFill>
-              </a:rPr>
-              <a:t>Fryjoff</a:t>
-            </a:r>
-            <a:r>
-              <a:rPr lang="en-US" dirty="0" smtClean="0">
-                <a:solidFill>
-                  <a:schemeClr val="tx1">
-                    <a:lumMod val="65000"/>
-                    <a:lumOff val="35000"/>
-                  </a:schemeClr>
-                </a:solidFill>
-              </a:rPr>
-              <a:t>-Hung</a:t>
-            </a:r>
-          </a:p>
-          <a:p>
-            <a:r>
-              <a:rPr lang="en-US" dirty="0" smtClean="0"/>
-              <a:t>Feb 2013</a:t>
-            </a:r>
-          </a:p>
-          <a:p>
-            <a:r>
-              <a:rPr lang="en-US" dirty="0" smtClean="0"/>
-              <a:t>University Extension</a:t>
-            </a:r>
-          </a:p>
-          <a:p>
-            <a:r>
-              <a:rPr lang="en-US" dirty="0" smtClean="0"/>
-              <a:t>Contact: </a:t>
-            </a:r>
-            <a:r>
-              <a:rPr lang="en-US" dirty="0" smtClean="0">
-                <a:hlinkClick r:id="rId2"/>
-              </a:rPr>
-              <a:t>nrsantos@ucdavis.edu</a:t>
-            </a:r>
-            <a:endParaRPr lang="en-US" dirty="0" smtClean="0"/>
-          </a:p>
-          <a:p>
-            <a:endParaRPr lang="en-US" dirty="0"/>
-          </a:p>
-          <a:p>
-            <a:r>
-              <a:rPr lang="en-US" dirty="0" smtClean="0"/>
-              <a:t>This presentation will </a:t>
-            </a:r>
-            <a:r>
-              <a:rPr lang="en-US" dirty="0"/>
-              <a:t>available online at </a:t>
-            </a:r>
-            <a:r>
-              <a:rPr lang="en-US" sz="2900" dirty="0">
-                <a:hlinkClick r:id="rId3"/>
-              </a:rPr>
-              <a:t>http://watershed.ucdavis.edu/resources/python-for-gis</a:t>
-            </a:r>
-            <a:endParaRPr lang="en-US" sz="2900" dirty="0"/>
-          </a:p>
-        </p:txBody>
-      </p:sp>
-    </p:spTree>
-    <p:extLst>
-      <p:ext uri="{BB962C8B-B14F-4D97-AF65-F5344CB8AC3E}">
-        <p14:creationId xmlns:p14="http://schemas.microsoft.com/office/powerpoint/2010/main" val="4024528369"/>
-      </p:ext>
-    </p:extLst>
-  </p:cSld>
-  <p:clrMapOvr>
-    <a:masterClrMapping/>
-  </p:clrMapOvr>
-  <p:timing>
-    <p:tnLst>
-      <p:par>
-        <p:cTn id="1" dur="indefinite" restart="never" nodeType="tmRoot"/>
-      </p:par>
-    </p:tnLst>
-  </p:timing>
-</p:sld>
-</file>
-
-<file path=ppt/slides/slide7.xml><?xml version="1.0" encoding="utf-8"?>
-<p:sld xmlns:a="http://schemas.openxmlformats.org/drawingml/2006/main" xmlns:r="http://schemas.openxmlformats.org/officeDocument/2006/relationships" xmlns:p="http://schemas.openxmlformats.org/presentationml/2006/main">
-  <p:cSld>
-    <p:spTree>
-      <p:nvGrpSpPr>
-        <p:cNvPr id="1" name=""/>
-        <p:cNvGrpSpPr/>
-        <p:nvPr/>
-      </p:nvGrpSpPr>
-      <p:grpSpPr>
-        <a:xfrm>
-          <a:off x="0" y="0"/>
-          <a:ext cx="0" cy="0"/>
-          <a:chOff x="0" y="0"/>
-          <a:chExt cx="0" cy="0"/>
-        </a:xfrm>
-      </p:grpSpPr>
-      <p:sp>
-        <p:nvSpPr>
-          <p:cNvPr id="2" name="Title 1"/>
-          <p:cNvSpPr>
-            <a:spLocks noGrp="1"/>
-          </p:cNvSpPr>
-          <p:nvPr>
-            <p:ph type="title"/>
-          </p:nvPr>
-        </p:nvSpPr>
-        <p:spPr/>
-        <p:txBody>
-          <a:bodyPr>
-            <a:normAutofit/>
-          </a:bodyPr>
-          <a:lstStyle/>
-          <a:p>
-            <a:r>
-              <a:rPr lang="en-US" dirty="0" smtClean="0"/>
-              <a:t>Most People’s Idea of a Program</a:t>
-            </a:r>
-            <a:endParaRPr lang="en-US" dirty="0"/>
-          </a:p>
-        </p:txBody>
-      </p:sp>
-      <p:sp>
-        <p:nvSpPr>
-          <p:cNvPr id="4" name="TextBox 3"/>
-          <p:cNvSpPr txBox="1"/>
-          <p:nvPr/>
-        </p:nvSpPr>
-        <p:spPr>
-          <a:xfrm>
-            <a:off x="0" y="1143000"/>
-            <a:ext cx="9144000" cy="400110"/>
-          </a:xfrm>
-          <a:prstGeom prst="rect">
-            <a:avLst/>
-          </a:prstGeom>
-          <a:noFill/>
-        </p:spPr>
-        <p:txBody>
-          <a:bodyPr wrap="square" rtlCol="0">
-            <a:spAutoFit/>
-          </a:bodyPr>
-          <a:lstStyle/>
-          <a:p>
-            <a:pPr algn="ctr"/>
-            <a:r>
-              <a:rPr lang="en-US" sz="2000" i="1" dirty="0" smtClean="0"/>
-              <a:t>Or, these days, an “app”</a:t>
-            </a:r>
-            <a:endParaRPr lang="en-US" sz="2000" i="1" dirty="0"/>
-          </a:p>
-        </p:txBody>
-      </p:sp>
-      <p:grpSp>
-        <p:nvGrpSpPr>
-          <p:cNvPr id="19" name="Group 18"/>
-          <p:cNvGrpSpPr/>
-          <p:nvPr/>
-        </p:nvGrpSpPr>
-        <p:grpSpPr>
-          <a:xfrm>
-            <a:off x="2362200" y="1905000"/>
-            <a:ext cx="4256313" cy="3962402"/>
-            <a:chOff x="2623457" y="2362200"/>
-            <a:chExt cx="4256313" cy="3962402"/>
-          </a:xfrm>
-          <a:effectLst>
-            <a:outerShdw blurRad="215900" dist="101600" dir="2700000" algn="tl" rotWithShape="0">
-              <a:prstClr val="black">
-                <a:alpha val="56000"/>
-              </a:prstClr>
-            </a:outerShdw>
-          </a:effectLst>
-        </p:grpSpPr>
-        <p:sp>
-          <p:nvSpPr>
-            <p:cNvPr id="6" name="Rectangle 5"/>
-            <p:cNvSpPr/>
-            <p:nvPr/>
-          </p:nvSpPr>
-          <p:spPr>
-            <a:xfrm>
-              <a:off x="3429000" y="2362200"/>
-              <a:ext cx="3408218" cy="3124200"/>
-            </a:xfrm>
-            <a:prstGeom prst="rect">
-              <a:avLst/>
-            </a:prstGeom>
-          </p:spPr>
-          <p:style>
-            <a:lnRef idx="2">
-              <a:schemeClr val="dk1">
-                <a:shade val="50000"/>
-              </a:schemeClr>
-            </a:lnRef>
-            <a:fillRef idx="1">
-              <a:schemeClr val="dk1"/>
-            </a:fillRef>
-            <a:effectRef idx="0">
-              <a:schemeClr val="dk1"/>
-            </a:effectRef>
-            <a:fontRef idx="minor">
-              <a:schemeClr val="lt1"/>
-            </a:fontRef>
-          </p:style>
-          <p:txBody>
-            <a:bodyPr rtlCol="0" anchor="ctr"/>
-            <a:lstStyle/>
-            <a:p>
-              <a:pPr algn="ctr"/>
-              <a:endParaRPr lang="en-US"/>
-            </a:p>
-          </p:txBody>
-        </p:sp>
-        <p:sp>
-          <p:nvSpPr>
-            <p:cNvPr id="7" name="Isosceles Triangle 6"/>
-            <p:cNvSpPr/>
-            <p:nvPr/>
-          </p:nvSpPr>
-          <p:spPr>
-            <a:xfrm>
-              <a:off x="2623457" y="2362200"/>
-              <a:ext cx="1567543" cy="609600"/>
-            </a:xfrm>
-            <a:prstGeom prst="triangle">
-              <a:avLst/>
-            </a:prstGeom>
-            <a:solidFill>
-              <a:schemeClr val="tx1">
-                <a:lumMod val="85000"/>
-                <a:lumOff val="15000"/>
-              </a:schemeClr>
-            </a:solidFill>
-            <a:ln>
-              <a:solidFill>
-                <a:schemeClr val="tx1">
-                  <a:lumMod val="85000"/>
-                  <a:lumOff val="15000"/>
-                </a:schemeClr>
-              </a:solidFill>
-            </a:ln>
-          </p:spPr>
-          <p:style>
-            <a:lnRef idx="2">
-              <a:schemeClr val="accent1">
-                <a:shade val="50000"/>
-              </a:schemeClr>
-            </a:lnRef>
-            <a:fillRef idx="1">
-              <a:schemeClr val="accent1"/>
-            </a:fillRef>
-            <a:effectRef idx="0">
-              <a:schemeClr val="accent1"/>
-            </a:effectRef>
-            <a:fontRef idx="minor">
-              <a:schemeClr val="lt1"/>
-            </a:fontRef>
-          </p:style>
-          <p:txBody>
-            <a:bodyPr rtlCol="0" anchor="ctr"/>
-            <a:lstStyle/>
-            <a:p>
-              <a:pPr algn="ctr"/>
-              <a:endParaRPr lang="en-US"/>
-            </a:p>
-          </p:txBody>
-        </p:sp>
-        <p:sp>
-          <p:nvSpPr>
-            <p:cNvPr id="10" name="Rectangle 9"/>
-            <p:cNvSpPr/>
-            <p:nvPr/>
-          </p:nvSpPr>
-          <p:spPr>
-            <a:xfrm>
-              <a:off x="3428999" y="2362200"/>
-              <a:ext cx="3408219" cy="609600"/>
-            </a:xfrm>
-            <a:prstGeom prst="rect">
-              <a:avLst/>
-            </a:prstGeom>
-            <a:solidFill>
-              <a:schemeClr val="tx1">
-                <a:lumMod val="85000"/>
-                <a:lumOff val="15000"/>
-              </a:schemeClr>
-            </a:solidFill>
-            <a:ln>
-              <a:solidFill>
-                <a:schemeClr val="tx1">
-                  <a:lumMod val="85000"/>
-                  <a:lumOff val="15000"/>
-                </a:schemeClr>
-              </a:solidFill>
-            </a:ln>
-          </p:spPr>
-          <p:style>
-            <a:lnRef idx="2">
-              <a:schemeClr val="accent1">
-                <a:shade val="50000"/>
-              </a:schemeClr>
-            </a:lnRef>
-            <a:fillRef idx="1">
-              <a:schemeClr val="accent1"/>
-            </a:fillRef>
-            <a:effectRef idx="0">
-              <a:schemeClr val="accent1"/>
-            </a:effectRef>
-            <a:fontRef idx="minor">
-              <a:schemeClr val="lt1"/>
-            </a:fontRef>
-          </p:style>
-          <p:txBody>
-            <a:bodyPr rtlCol="0" anchor="ctr"/>
-            <a:lstStyle/>
-            <a:p>
-              <a:pPr algn="ctr"/>
-              <a:endParaRPr lang="en-US"/>
-            </a:p>
-          </p:txBody>
-        </p:sp>
-        <p:sp>
-          <p:nvSpPr>
-            <p:cNvPr id="11" name="Rectangle 10"/>
-            <p:cNvSpPr/>
-            <p:nvPr/>
-          </p:nvSpPr>
-          <p:spPr>
-            <a:xfrm rot="5400000">
-              <a:off x="5031919" y="3600453"/>
-              <a:ext cx="3086102" cy="609600"/>
-            </a:xfrm>
-            <a:prstGeom prst="rect">
-              <a:avLst/>
-            </a:prstGeom>
-            <a:solidFill>
-              <a:schemeClr val="tx1">
-                <a:lumMod val="85000"/>
-                <a:lumOff val="15000"/>
-              </a:schemeClr>
-            </a:solidFill>
-            <a:ln>
-              <a:solidFill>
-                <a:schemeClr val="tx1">
-                  <a:lumMod val="85000"/>
-                  <a:lumOff val="15000"/>
-                </a:schemeClr>
-              </a:solidFill>
-            </a:ln>
-          </p:spPr>
-          <p:style>
-            <a:lnRef idx="2">
-              <a:schemeClr val="accent1">
-                <a:shade val="50000"/>
-              </a:schemeClr>
-            </a:lnRef>
-            <a:fillRef idx="1">
-              <a:schemeClr val="accent1"/>
-            </a:fillRef>
-            <a:effectRef idx="0">
-              <a:schemeClr val="accent1"/>
-            </a:effectRef>
-            <a:fontRef idx="minor">
-              <a:schemeClr val="lt1"/>
-            </a:fontRef>
-          </p:style>
-          <p:txBody>
-            <a:bodyPr rtlCol="0" anchor="ctr"/>
-            <a:lstStyle/>
-            <a:p>
-              <a:pPr algn="ctr"/>
-              <a:endParaRPr lang="en-US"/>
-            </a:p>
-          </p:txBody>
-        </p:sp>
-        <p:sp>
-          <p:nvSpPr>
-            <p:cNvPr id="9" name="Isosceles Triangle 8"/>
-            <p:cNvSpPr/>
-            <p:nvPr/>
-          </p:nvSpPr>
-          <p:spPr>
-            <a:xfrm rot="5400000">
-              <a:off x="5698670" y="5143503"/>
-              <a:ext cx="1752600" cy="609598"/>
-            </a:xfrm>
-            <a:prstGeom prst="triangle">
-              <a:avLst/>
-            </a:prstGeom>
-            <a:solidFill>
-              <a:schemeClr val="tx1">
-                <a:lumMod val="85000"/>
-                <a:lumOff val="15000"/>
-              </a:schemeClr>
-            </a:solidFill>
-            <a:ln>
-              <a:solidFill>
-                <a:schemeClr val="tx1">
-                  <a:lumMod val="85000"/>
-                  <a:lumOff val="15000"/>
-                </a:schemeClr>
-              </a:solidFill>
-            </a:ln>
-          </p:spPr>
-          <p:style>
-            <a:lnRef idx="2">
-              <a:schemeClr val="accent1">
-                <a:shade val="50000"/>
-              </a:schemeClr>
-            </a:lnRef>
-            <a:fillRef idx="1">
-              <a:schemeClr val="accent1"/>
-            </a:fillRef>
-            <a:effectRef idx="0">
-              <a:schemeClr val="accent1"/>
-            </a:effectRef>
-            <a:fontRef idx="minor">
-              <a:schemeClr val="lt1"/>
-            </a:fontRef>
-          </p:style>
-          <p:txBody>
-            <a:bodyPr rtlCol="0" anchor="ctr"/>
-            <a:lstStyle/>
-            <a:p>
-              <a:pPr algn="ctr"/>
-              <a:endParaRPr lang="en-US"/>
-            </a:p>
-          </p:txBody>
-        </p:sp>
-        <p:cxnSp>
-          <p:nvCxnSpPr>
-            <p:cNvPr id="13" name="Straight Connector 12"/>
-            <p:cNvCxnSpPr/>
-            <p:nvPr/>
-          </p:nvCxnSpPr>
-          <p:spPr>
-            <a:xfrm flipV="1">
-              <a:off x="5133108" y="2362200"/>
-              <a:ext cx="1746662" cy="1752600"/>
-            </a:xfrm>
-            <a:prstGeom prst="line">
-              <a:avLst/>
-            </a:prstGeom>
-            <a:ln w="19050">
-              <a:solidFill>
-                <a:schemeClr val="tx1">
-                  <a:lumMod val="95000"/>
-                  <a:lumOff val="5000"/>
-                </a:schemeClr>
-              </a:solidFill>
-            </a:ln>
-          </p:spPr>
-          <p:style>
-            <a:lnRef idx="1">
-              <a:schemeClr val="accent1"/>
-            </a:lnRef>
-            <a:fillRef idx="0">
-              <a:schemeClr val="accent1"/>
-            </a:fillRef>
-            <a:effectRef idx="0">
-              <a:schemeClr val="accent1"/>
-            </a:effectRef>
-            <a:fontRef idx="minor">
-              <a:schemeClr val="tx1"/>
-            </a:fontRef>
-          </p:style>
-        </p:cxnSp>
-        <p:sp>
-          <p:nvSpPr>
-            <p:cNvPr id="5" name="Rectangle 4"/>
-            <p:cNvSpPr/>
-            <p:nvPr/>
-          </p:nvSpPr>
-          <p:spPr>
-            <a:xfrm>
-              <a:off x="2623457" y="2971800"/>
-              <a:ext cx="3657600" cy="3352800"/>
-            </a:xfrm>
-            <a:prstGeom prst="rect">
-              <a:avLst/>
-            </a:prstGeom>
-          </p:spPr>
-          <p:style>
-            <a:lnRef idx="2">
-              <a:schemeClr val="dk1">
-                <a:shade val="50000"/>
-              </a:schemeClr>
-            </a:lnRef>
-            <a:fillRef idx="1">
-              <a:schemeClr val="dk1"/>
-            </a:fillRef>
-            <a:effectRef idx="0">
-              <a:schemeClr val="dk1"/>
-            </a:effectRef>
-            <a:fontRef idx="minor">
-              <a:schemeClr val="lt1"/>
-            </a:fontRef>
-          </p:style>
-          <p:txBody>
-            <a:bodyPr rtlCol="0" anchor="ctr"/>
-            <a:lstStyle/>
-            <a:p>
-              <a:pPr algn="ctr"/>
-              <a:endParaRPr lang="en-US"/>
-            </a:p>
-          </p:txBody>
-        </p:sp>
-      </p:grpSp>
-    </p:spTree>
-    <p:extLst>
-      <p:ext uri="{BB962C8B-B14F-4D97-AF65-F5344CB8AC3E}">
-        <p14:creationId xmlns:p14="http://schemas.microsoft.com/office/powerpoint/2010/main" val="2466324471"/>
-      </p:ext>
-    </p:extLst>
-  </p:cSld>
-  <p:clrMapOvr>
-    <a:masterClrMapping/>
-  </p:clrMapOvr>
-  <p:timing>
-    <p:tnLst>
-      <p:par>
-        <p:cTn id="1" dur="indefinite" restart="never" nodeType="tmRoot"/>
-      </p:par>
-    </p:tnLst>
-  </p:timing>
-</p:sld>
-</file>
-
 <file path=ppt/slides/slide8.xml><?xml version="1.0" encoding="utf-8"?>
 <p:sld xmlns:a="http://schemas.openxmlformats.org/drawingml/2006/main" xmlns:r="http://schemas.openxmlformats.org/officeDocument/2006/relationships" xmlns:p="http://schemas.openxmlformats.org/presentationml/2006/main">
   <p:cSld>
@@ -12854,443 +12766,214 @@
         </p:nvSpPr>
         <p:spPr/>
         <p:txBody>
+          <a:bodyPr/>
+          <a:lstStyle/>
+          <a:p>
+            <a:r>
+              <a:rPr lang="en-US" dirty="0" smtClean="0"/>
+              <a:t>Conditionals</a:t>
+            </a:r>
+            <a:endParaRPr lang="en-US" dirty="0"/>
+          </a:p>
+        </p:txBody>
+      </p:sp>
+      <p:sp>
+        <p:nvSpPr>
+          <p:cNvPr id="3" name="Content Placeholder 2"/>
+          <p:cNvSpPr>
+            <a:spLocks noGrp="1"/>
+          </p:cNvSpPr>
+          <p:nvPr>
+            <p:ph idx="1"/>
+          </p:nvPr>
+        </p:nvSpPr>
+        <p:spPr>
+          <a:xfrm>
+            <a:off x="628650" y="2226469"/>
+            <a:ext cx="3667125" cy="3263504"/>
+          </a:xfrm>
+        </p:spPr>
+        <p:txBody>
           <a:bodyPr>
-            <a:normAutofit/>
+            <a:normAutofit fontScale="85000" lnSpcReduction="10000"/>
           </a:bodyPr>
           <a:lstStyle/>
           <a:p>
+            <a:pPr marL="0" indent="0">
+              <a:buNone/>
+            </a:pPr>
+            <a:r>
+              <a:rPr lang="en-US" sz="2400" b="1" dirty="0"/>
+              <a:t>General Form</a:t>
+            </a:r>
+            <a:endParaRPr lang="en-US" sz="1800" dirty="0"/>
+          </a:p>
+          <a:p>
+            <a:pPr marL="0" indent="0">
+              <a:buNone/>
+            </a:pPr>
+            <a:r>
+              <a:rPr lang="en-US" dirty="0" smtClean="0">
+                <a:solidFill>
+                  <a:schemeClr val="accent6">
+                    <a:lumMod val="50000"/>
+                  </a:schemeClr>
+                </a:solidFill>
+              </a:rPr>
+              <a:t>if</a:t>
+            </a:r>
             <a:r>
               <a:rPr lang="en-US" dirty="0" smtClean="0"/>
-              <a:t>A </a:t>
-            </a:r>
-            <a:r>
-              <a:rPr lang="en-US" i="1" dirty="0" smtClean="0"/>
-              <a:t>maybe</a:t>
+              <a:t> {condition evaluates to true}:</a:t>
+            </a:r>
+          </a:p>
+          <a:p>
+            <a:pPr marL="0" indent="0">
+              <a:buNone/>
+            </a:pPr>
+            <a:r>
+              <a:rPr lang="en-US" dirty="0"/>
+              <a:t> </a:t>
             </a:r>
             <a:r>
               <a:rPr lang="en-US" dirty="0" smtClean="0"/>
-              <a:t> more accurate picture</a:t>
-            </a:r>
-            <a:endParaRPr lang="en-US" dirty="0"/>
+              <a:t>    {run some code}</a:t>
+            </a:r>
+          </a:p>
+          <a:p>
+            <a:pPr marL="0" indent="0">
+              <a:buNone/>
+            </a:pPr>
+            <a:r>
+              <a:rPr lang="en-US" dirty="0" smtClean="0">
+                <a:solidFill>
+                  <a:schemeClr val="accent6">
+                    <a:lumMod val="50000"/>
+                  </a:schemeClr>
+                </a:solidFill>
+              </a:rPr>
+              <a:t>else</a:t>
+            </a:r>
+            <a:r>
+              <a:rPr lang="en-US" dirty="0" smtClean="0"/>
+              <a:t>: # condition is false</a:t>
+            </a:r>
+          </a:p>
+          <a:p>
+            <a:pPr marL="0" indent="0">
+              <a:buNone/>
+            </a:pPr>
+            <a:r>
+              <a:rPr lang="en-US" dirty="0"/>
+              <a:t> </a:t>
+            </a:r>
+            <a:r>
+              <a:rPr lang="en-US" dirty="0" smtClean="0"/>
+              <a:t>   {run different code}</a:t>
+            </a:r>
           </a:p>
         </p:txBody>
       </p:sp>
       <p:sp>
         <p:nvSpPr>
-          <p:cNvPr id="5" name="TextBox 4"/>
-          <p:cNvSpPr txBox="1"/>
+          <p:cNvPr id="4" name="Rectangle 3"/>
+          <p:cNvSpPr/>
           <p:nvPr/>
         </p:nvSpPr>
         <p:spPr>
           <a:xfrm>
-            <a:off x="2286000" y="5879070"/>
-            <a:ext cx="5105400" cy="369332"/>
+            <a:off x="5181600" y="2226469"/>
+            <a:ext cx="2524125" cy="1754326"/>
           </a:xfrm>
           <a:prstGeom prst="rect">
             <a:avLst/>
           </a:prstGeom>
-          <a:noFill/>
         </p:spPr>
         <p:txBody>
-          <a:bodyPr wrap="square" rtlCol="0">
+          <a:bodyPr wrap="square">
             <a:spAutoFit/>
           </a:bodyPr>
           <a:lstStyle/>
           <a:p>
             <a:r>
-              <a:rPr lang="en-US" dirty="0" err="1" smtClean="0"/>
-              <a:t>TinkerToy</a:t>
-            </a:r>
-            <a:r>
-              <a:rPr lang="en-US" dirty="0" smtClean="0"/>
-              <a:t> Source: </a:t>
-            </a:r>
-            <a:r>
-              <a:rPr lang="en-US" dirty="0" smtClean="0">
-                <a:hlinkClick r:id="rId3"/>
-              </a:rPr>
-              <a:t>Wikimedia Commons</a:t>
-            </a:r>
-            <a:endParaRPr lang="en-US" dirty="0"/>
+              <a:rPr lang="en-US" sz="2400" b="1" dirty="0"/>
+              <a:t>Example</a:t>
+            </a:r>
+          </a:p>
+          <a:p>
+            <a:r>
+              <a:rPr lang="en-US" sz="2100" dirty="0">
+                <a:solidFill>
+                  <a:schemeClr val="accent6">
+                    <a:lumMod val="50000"/>
+                  </a:schemeClr>
+                </a:solidFill>
+              </a:rPr>
+              <a:t>if</a:t>
+            </a:r>
+            <a:r>
+              <a:rPr lang="en-US" sz="2100" dirty="0"/>
+              <a:t> value &gt; threshold:</a:t>
+            </a:r>
+          </a:p>
+          <a:p>
+            <a:r>
+              <a:rPr lang="en-US" sz="2100" dirty="0"/>
+              <a:t>   </a:t>
+            </a:r>
+            <a:r>
+              <a:rPr lang="en-US" sz="2100" dirty="0">
+                <a:solidFill>
+                  <a:schemeClr val="accent6">
+                    <a:lumMod val="50000"/>
+                  </a:schemeClr>
+                </a:solidFill>
+              </a:rPr>
+              <a:t>return</a:t>
+            </a:r>
+            <a:r>
+              <a:rPr lang="en-US" sz="2100" dirty="0"/>
+              <a:t> True</a:t>
+            </a:r>
+          </a:p>
+          <a:p>
+            <a:r>
+              <a:rPr lang="en-US" sz="2100" dirty="0">
+                <a:solidFill>
+                  <a:schemeClr val="accent6">
+                    <a:lumMod val="50000"/>
+                  </a:schemeClr>
+                </a:solidFill>
+              </a:rPr>
+              <a:t>else</a:t>
+            </a:r>
+            <a:r>
+              <a:rPr lang="en-US" sz="2100" dirty="0"/>
+              <a:t>:</a:t>
+            </a:r>
+          </a:p>
+          <a:p>
+            <a:r>
+              <a:rPr lang="en-US" sz="2100" dirty="0">
+                <a:solidFill>
+                  <a:schemeClr val="accent6">
+                    <a:lumMod val="50000"/>
+                  </a:schemeClr>
+                </a:solidFill>
+              </a:rPr>
+              <a:t>    return </a:t>
+            </a:r>
+            <a:r>
+              <a:rPr lang="en-US" sz="2100" dirty="0"/>
+              <a:t>False</a:t>
+            </a:r>
           </a:p>
         </p:txBody>
       </p:sp>
-      <p:grpSp>
-        <p:nvGrpSpPr>
-          <p:cNvPr id="3" name="Group 2"/>
-          <p:cNvGrpSpPr/>
-          <p:nvPr/>
-        </p:nvGrpSpPr>
-        <p:grpSpPr>
-          <a:xfrm>
-            <a:off x="2220687" y="1905000"/>
-            <a:ext cx="4408713" cy="3962402"/>
-            <a:chOff x="1828800" y="1531380"/>
-            <a:chExt cx="4408713" cy="3962402"/>
-          </a:xfrm>
-        </p:grpSpPr>
-        <p:pic>
-          <p:nvPicPr>
-            <p:cNvPr id="1026" name="Picture 2" descr="http://upload.wikimedia.org/wikipedia/commons/b/b3/Tinkertoy_300126232168_.JPG"/>
-            <p:cNvPicPr>
-              <a:picLocks noChangeAspect="1" noChangeArrowheads="1"/>
-            </p:cNvPicPr>
-            <p:nvPr/>
-          </p:nvPicPr>
-          <p:blipFill rotWithShape="1">
-            <a:blip r:embed="rId4">
-              <a:extLst>
-                <a:ext uri="{28A0092B-C50C-407E-A947-70E740481C1C}">
-                  <a14:useLocalDpi xmlns:a14="http://schemas.microsoft.com/office/drawing/2010/main" val="0"/>
-                </a:ext>
-              </a:extLst>
-            </a:blip>
-            <a:srcRect l="-3201" t="-695" r="26066" b="11830"/>
-            <a:stretch/>
-          </p:blipFill>
-          <p:spPr bwMode="auto">
-            <a:xfrm>
-              <a:off x="1828800" y="2114548"/>
-              <a:ext cx="3815938" cy="3379234"/>
-            </a:xfrm>
-            <a:prstGeom prst="rect">
-              <a:avLst/>
-            </a:prstGeom>
-            <a:noFill/>
-            <a:extLst>
-              <a:ext uri="{909E8E84-426E-40DD-AFC4-6F175D3DCCD1}">
-                <a14:hiddenFill xmlns:a14="http://schemas.microsoft.com/office/drawing/2010/main">
-                  <a:solidFill>
-                    <a:srgbClr val="FFFFFF"/>
-                  </a:solidFill>
-                </a14:hiddenFill>
-              </a:ext>
-            </a:extLst>
-          </p:spPr>
-        </p:pic>
-        <p:grpSp>
-          <p:nvGrpSpPr>
-            <p:cNvPr id="7" name="Group 6"/>
-            <p:cNvGrpSpPr/>
-            <p:nvPr/>
-          </p:nvGrpSpPr>
-          <p:grpSpPr>
-            <a:xfrm>
-              <a:off x="1981200" y="1531380"/>
-              <a:ext cx="4256313" cy="3962402"/>
-              <a:chOff x="2623457" y="2362200"/>
-              <a:chExt cx="4256313" cy="3962402"/>
-            </a:xfrm>
-            <a:effectLst>
-              <a:outerShdw blurRad="215900" dist="101600" dir="2700000" algn="tl" rotWithShape="0">
-                <a:prstClr val="black">
-                  <a:alpha val="56000"/>
-                </a:prstClr>
-              </a:outerShdw>
-            </a:effectLst>
-          </p:grpSpPr>
-          <p:sp>
-            <p:nvSpPr>
-              <p:cNvPr id="9" name="Isosceles Triangle 8"/>
-              <p:cNvSpPr/>
-              <p:nvPr/>
-            </p:nvSpPr>
-            <p:spPr>
-              <a:xfrm>
-                <a:off x="2623457" y="2362200"/>
-                <a:ext cx="1567543" cy="609600"/>
-              </a:xfrm>
-              <a:prstGeom prst="triangle">
-                <a:avLst/>
-              </a:prstGeom>
-              <a:solidFill>
-                <a:schemeClr val="tx1">
-                  <a:lumMod val="85000"/>
-                  <a:lumOff val="15000"/>
-                </a:schemeClr>
-              </a:solidFill>
-              <a:ln>
-                <a:solidFill>
-                  <a:schemeClr val="tx1">
-                    <a:lumMod val="85000"/>
-                    <a:lumOff val="15000"/>
-                  </a:schemeClr>
-                </a:solidFill>
-              </a:ln>
-            </p:spPr>
-            <p:style>
-              <a:lnRef idx="2">
-                <a:schemeClr val="accent1">
-                  <a:shade val="50000"/>
-                </a:schemeClr>
-              </a:lnRef>
-              <a:fillRef idx="1">
-                <a:schemeClr val="accent1"/>
-              </a:fillRef>
-              <a:effectRef idx="0">
-                <a:schemeClr val="accent1"/>
-              </a:effectRef>
-              <a:fontRef idx="minor">
-                <a:schemeClr val="lt1"/>
-              </a:fontRef>
-            </p:style>
-            <p:txBody>
-              <a:bodyPr rtlCol="0" anchor="ctr"/>
-              <a:lstStyle/>
-              <a:p>
-                <a:pPr algn="ctr"/>
-                <a:endParaRPr lang="en-US"/>
-              </a:p>
-            </p:txBody>
-          </p:sp>
-          <p:sp>
-            <p:nvSpPr>
-              <p:cNvPr id="10" name="Rectangle 9"/>
-              <p:cNvSpPr/>
-              <p:nvPr/>
-            </p:nvSpPr>
-            <p:spPr>
-              <a:xfrm>
-                <a:off x="3428999" y="2362200"/>
-                <a:ext cx="3408219" cy="609600"/>
-              </a:xfrm>
-              <a:prstGeom prst="rect">
-                <a:avLst/>
-              </a:prstGeom>
-              <a:solidFill>
-                <a:schemeClr val="tx1">
-                  <a:lumMod val="85000"/>
-                  <a:lumOff val="15000"/>
-                </a:schemeClr>
-              </a:solidFill>
-              <a:ln>
-                <a:solidFill>
-                  <a:schemeClr val="tx1">
-                    <a:lumMod val="85000"/>
-                    <a:lumOff val="15000"/>
-                  </a:schemeClr>
-                </a:solidFill>
-              </a:ln>
-            </p:spPr>
-            <p:style>
-              <a:lnRef idx="2">
-                <a:schemeClr val="accent1">
-                  <a:shade val="50000"/>
-                </a:schemeClr>
-              </a:lnRef>
-              <a:fillRef idx="1">
-                <a:schemeClr val="accent1"/>
-              </a:fillRef>
-              <a:effectRef idx="0">
-                <a:schemeClr val="accent1"/>
-              </a:effectRef>
-              <a:fontRef idx="minor">
-                <a:schemeClr val="lt1"/>
-              </a:fontRef>
-            </p:style>
-            <p:txBody>
-              <a:bodyPr rtlCol="0" anchor="ctr"/>
-              <a:lstStyle/>
-              <a:p>
-                <a:pPr algn="ctr"/>
-                <a:endParaRPr lang="en-US"/>
-              </a:p>
-            </p:txBody>
-          </p:sp>
-          <p:sp>
-            <p:nvSpPr>
-              <p:cNvPr id="11" name="Rectangle 10"/>
-              <p:cNvSpPr/>
-              <p:nvPr/>
-            </p:nvSpPr>
-            <p:spPr>
-              <a:xfrm rot="5400000">
-                <a:off x="5031919" y="3600453"/>
-                <a:ext cx="3086102" cy="609600"/>
-              </a:xfrm>
-              <a:prstGeom prst="rect">
-                <a:avLst/>
-              </a:prstGeom>
-              <a:solidFill>
-                <a:schemeClr val="tx1">
-                  <a:lumMod val="85000"/>
-                  <a:lumOff val="15000"/>
-                </a:schemeClr>
-              </a:solidFill>
-              <a:ln>
-                <a:solidFill>
-                  <a:schemeClr val="tx1">
-                    <a:lumMod val="85000"/>
-                    <a:lumOff val="15000"/>
-                  </a:schemeClr>
-                </a:solidFill>
-              </a:ln>
-            </p:spPr>
-            <p:style>
-              <a:lnRef idx="2">
-                <a:schemeClr val="accent1">
-                  <a:shade val="50000"/>
-                </a:schemeClr>
-              </a:lnRef>
-              <a:fillRef idx="1">
-                <a:schemeClr val="accent1"/>
-              </a:fillRef>
-              <a:effectRef idx="0">
-                <a:schemeClr val="accent1"/>
-              </a:effectRef>
-              <a:fontRef idx="minor">
-                <a:schemeClr val="lt1"/>
-              </a:fontRef>
-            </p:style>
-            <p:txBody>
-              <a:bodyPr rtlCol="0" anchor="ctr"/>
-              <a:lstStyle/>
-              <a:p>
-                <a:pPr algn="ctr"/>
-                <a:endParaRPr lang="en-US"/>
-              </a:p>
-            </p:txBody>
-          </p:sp>
-          <p:sp>
-            <p:nvSpPr>
-              <p:cNvPr id="12" name="Isosceles Triangle 11"/>
-              <p:cNvSpPr/>
-              <p:nvPr/>
-            </p:nvSpPr>
-            <p:spPr>
-              <a:xfrm rot="5400000">
-                <a:off x="5698670" y="5143503"/>
-                <a:ext cx="1752600" cy="609598"/>
-              </a:xfrm>
-              <a:prstGeom prst="triangle">
-                <a:avLst/>
-              </a:prstGeom>
-              <a:solidFill>
-                <a:schemeClr val="tx1">
-                  <a:lumMod val="85000"/>
-                  <a:lumOff val="15000"/>
-                </a:schemeClr>
-              </a:solidFill>
-              <a:ln>
-                <a:solidFill>
-                  <a:schemeClr val="tx1">
-                    <a:lumMod val="85000"/>
-                    <a:lumOff val="15000"/>
-                  </a:schemeClr>
-                </a:solidFill>
-              </a:ln>
-            </p:spPr>
-            <p:style>
-              <a:lnRef idx="2">
-                <a:schemeClr val="accent1">
-                  <a:shade val="50000"/>
-                </a:schemeClr>
-              </a:lnRef>
-              <a:fillRef idx="1">
-                <a:schemeClr val="accent1"/>
-              </a:fillRef>
-              <a:effectRef idx="0">
-                <a:schemeClr val="accent1"/>
-              </a:effectRef>
-              <a:fontRef idx="minor">
-                <a:schemeClr val="lt1"/>
-              </a:fontRef>
-            </p:style>
-            <p:txBody>
-              <a:bodyPr rtlCol="0" anchor="ctr"/>
-              <a:lstStyle/>
-              <a:p>
-                <a:pPr algn="ctr"/>
-                <a:endParaRPr lang="en-US"/>
-              </a:p>
-            </p:txBody>
-          </p:sp>
-          <p:cxnSp>
-            <p:nvCxnSpPr>
-              <p:cNvPr id="13" name="Straight Connector 12"/>
-              <p:cNvCxnSpPr/>
-              <p:nvPr/>
-            </p:nvCxnSpPr>
-            <p:spPr>
-              <a:xfrm flipV="1">
-                <a:off x="6270170" y="2362200"/>
-                <a:ext cx="609600" cy="609600"/>
-              </a:xfrm>
-              <a:prstGeom prst="line">
-                <a:avLst/>
-              </a:prstGeom>
-              <a:ln w="19050">
-                <a:solidFill>
-                  <a:schemeClr val="tx1">
-                    <a:lumMod val="95000"/>
-                    <a:lumOff val="5000"/>
-                  </a:schemeClr>
-                </a:solidFill>
-              </a:ln>
-            </p:spPr>
-            <p:style>
-              <a:lnRef idx="1">
-                <a:schemeClr val="accent1"/>
-              </a:lnRef>
-              <a:fillRef idx="0">
-                <a:schemeClr val="accent1"/>
-              </a:fillRef>
-              <a:effectRef idx="0">
-                <a:schemeClr val="accent1"/>
-              </a:effectRef>
-              <a:fontRef idx="minor">
-                <a:schemeClr val="tx1"/>
-              </a:fontRef>
-            </p:style>
-          </p:cxnSp>
-          <p:sp>
-            <p:nvSpPr>
-              <p:cNvPr id="14" name="Rectangle 13"/>
-              <p:cNvSpPr/>
-              <p:nvPr/>
-            </p:nvSpPr>
-            <p:spPr>
-              <a:xfrm>
-                <a:off x="2623457" y="2971800"/>
-                <a:ext cx="3657600" cy="3352800"/>
-              </a:xfrm>
-              <a:prstGeom prst="rect">
-                <a:avLst/>
-              </a:prstGeom>
-              <a:noFill/>
-              <a:ln w="38100"/>
-            </p:spPr>
-            <p:style>
-              <a:lnRef idx="2">
-                <a:schemeClr val="dk1">
-                  <a:shade val="50000"/>
-                </a:schemeClr>
-              </a:lnRef>
-              <a:fillRef idx="1">
-                <a:schemeClr val="dk1"/>
-              </a:fillRef>
-              <a:effectRef idx="0">
-                <a:schemeClr val="dk1"/>
-              </a:effectRef>
-              <a:fontRef idx="minor">
-                <a:schemeClr val="lt1"/>
-              </a:fontRef>
-            </p:style>
-            <p:txBody>
-              <a:bodyPr rtlCol="0" anchor="ctr"/>
-              <a:lstStyle/>
-              <a:p>
-                <a:pPr algn="ctr"/>
-                <a:endParaRPr lang="en-US"/>
-              </a:p>
-            </p:txBody>
-          </p:sp>
-        </p:grpSp>
-      </p:grpSp>
     </p:spTree>
     <p:extLst>
       <p:ext uri="{BB962C8B-B14F-4D97-AF65-F5344CB8AC3E}">
-        <p14:creationId xmlns:p14="http://schemas.microsoft.com/office/powerpoint/2010/main" val="2226850277"/>
+        <p14:creationId xmlns:p14="http://schemas.microsoft.com/office/powerpoint/2010/main" val="2374134354"/>
       </p:ext>
     </p:extLst>
   </p:cSld>

</xml_diff>